<commit_message>
Backup. Waiting for equipment.
</commit_message>
<xml_diff>
--- a/Big Mountain Slide Deck.pptx
+++ b/Big Mountain Slide Deck.pptx
@@ -7,6 +7,9 @@
   <p:sldIdLst>
     <p:sldId id="256" r:id="rId2"/>
     <p:sldId id="257" r:id="rId3"/>
+    <p:sldId id="258" r:id="rId4"/>
+    <p:sldId id="259" r:id="rId5"/>
+    <p:sldId id="260" r:id="rId6"/>
   </p:sldIdLst>
   <p:sldSz cx="12192000" cy="6858000"/>
   <p:notesSz cx="6858000" cy="9144000"/>
@@ -105,6 +108,11 @@
       </a:defRPr>
     </a:lvl9pPr>
   </p:defaultTextStyle>
+  <p:extLst>
+    <p:ext uri="{EFAFB233-063F-42B5-8137-9DF3F51BA10A}">
+      <p15:sldGuideLst xmlns:p15="http://schemas.microsoft.com/office/powerpoint/2012/main"/>
+    </p:ext>
+  </p:extLst>
 </p:presentation>
 </file>
 
@@ -239,7 +247,7 @@
           <a:p>
             <a:fld id="{F3089C9E-662A-4F13-97B2-6CDBC3D9ACAA}" type="datetimeFigureOut">
               <a:rPr lang="en-US" smtClean="0"/>
-              <a:t>7/26/2022</a:t>
+              <a:t>7/27/2022</a:t>
             </a:fld>
             <a:endParaRPr lang="en-US"/>
           </a:p>
@@ -409,7 +417,7 @@
           <a:p>
             <a:fld id="{F3089C9E-662A-4F13-97B2-6CDBC3D9ACAA}" type="datetimeFigureOut">
               <a:rPr lang="en-US" smtClean="0"/>
-              <a:t>7/26/2022</a:t>
+              <a:t>7/27/2022</a:t>
             </a:fld>
             <a:endParaRPr lang="en-US"/>
           </a:p>
@@ -589,7 +597,7 @@
           <a:p>
             <a:fld id="{F3089C9E-662A-4F13-97B2-6CDBC3D9ACAA}" type="datetimeFigureOut">
               <a:rPr lang="en-US" smtClean="0"/>
-              <a:t>7/26/2022</a:t>
+              <a:t>7/27/2022</a:t>
             </a:fld>
             <a:endParaRPr lang="en-US"/>
           </a:p>
@@ -759,7 +767,7 @@
           <a:p>
             <a:fld id="{F3089C9E-662A-4F13-97B2-6CDBC3D9ACAA}" type="datetimeFigureOut">
               <a:rPr lang="en-US" smtClean="0"/>
-              <a:t>7/26/2022</a:t>
+              <a:t>7/27/2022</a:t>
             </a:fld>
             <a:endParaRPr lang="en-US"/>
           </a:p>
@@ -1005,7 +1013,7 @@
           <a:p>
             <a:fld id="{F3089C9E-662A-4F13-97B2-6CDBC3D9ACAA}" type="datetimeFigureOut">
               <a:rPr lang="en-US" smtClean="0"/>
-              <a:t>7/26/2022</a:t>
+              <a:t>7/27/2022</a:t>
             </a:fld>
             <a:endParaRPr lang="en-US"/>
           </a:p>
@@ -1237,7 +1245,7 @@
           <a:p>
             <a:fld id="{F3089C9E-662A-4F13-97B2-6CDBC3D9ACAA}" type="datetimeFigureOut">
               <a:rPr lang="en-US" smtClean="0"/>
-              <a:t>7/26/2022</a:t>
+              <a:t>7/27/2022</a:t>
             </a:fld>
             <a:endParaRPr lang="en-US"/>
           </a:p>
@@ -1604,7 +1612,7 @@
           <a:p>
             <a:fld id="{F3089C9E-662A-4F13-97B2-6CDBC3D9ACAA}" type="datetimeFigureOut">
               <a:rPr lang="en-US" smtClean="0"/>
-              <a:t>7/26/2022</a:t>
+              <a:t>7/27/2022</a:t>
             </a:fld>
             <a:endParaRPr lang="en-US"/>
           </a:p>
@@ -1722,7 +1730,7 @@
           <a:p>
             <a:fld id="{F3089C9E-662A-4F13-97B2-6CDBC3D9ACAA}" type="datetimeFigureOut">
               <a:rPr lang="en-US" smtClean="0"/>
-              <a:t>7/26/2022</a:t>
+              <a:t>7/27/2022</a:t>
             </a:fld>
             <a:endParaRPr lang="en-US"/>
           </a:p>
@@ -1817,7 +1825,7 @@
           <a:p>
             <a:fld id="{F3089C9E-662A-4F13-97B2-6CDBC3D9ACAA}" type="datetimeFigureOut">
               <a:rPr lang="en-US" smtClean="0"/>
-              <a:t>7/26/2022</a:t>
+              <a:t>7/27/2022</a:t>
             </a:fld>
             <a:endParaRPr lang="en-US"/>
           </a:p>
@@ -2094,7 +2102,7 @@
           <a:p>
             <a:fld id="{F3089C9E-662A-4F13-97B2-6CDBC3D9ACAA}" type="datetimeFigureOut">
               <a:rPr lang="en-US" smtClean="0"/>
-              <a:t>7/26/2022</a:t>
+              <a:t>7/27/2022</a:t>
             </a:fld>
             <a:endParaRPr lang="en-US"/>
           </a:p>
@@ -2351,7 +2359,7 @@
           <a:p>
             <a:fld id="{F3089C9E-662A-4F13-97B2-6CDBC3D9ACAA}" type="datetimeFigureOut">
               <a:rPr lang="en-US" smtClean="0"/>
-              <a:t>7/26/2022</a:t>
+              <a:t>7/27/2022</a:t>
             </a:fld>
             <a:endParaRPr lang="en-US"/>
           </a:p>
@@ -2564,7 +2572,7 @@
           <a:p>
             <a:fld id="{F3089C9E-662A-4F13-97B2-6CDBC3D9ACAA}" type="datetimeFigureOut">
               <a:rPr lang="en-US" smtClean="0"/>
-              <a:t>7/26/2022</a:t>
+              <a:t>7/27/2022</a:t>
             </a:fld>
             <a:endParaRPr lang="en-US"/>
           </a:p>
@@ -2979,10 +2987,10 @@
       </p:grpSpPr>
       <p:pic>
         <p:nvPicPr>
-          <p:cNvPr id="1026" name="Picture 2" descr="Whitefish Mountain Resort | Bus Trip or Ski &amp; Stay Packages | Backside Tours">
+          <p:cNvPr id="4" name="Picture 2" descr="Mountains Snow White - Free image on Pixabay">
             <a:extLst>
               <a:ext uri="{FF2B5EF4-FFF2-40B4-BE49-F238E27FC236}">
-                <a16:creationId xmlns:a16="http://schemas.microsoft.com/office/drawing/2014/main" id="{883440D8-9FBD-3D9B-A332-4B3ACA8B5D02}"/>
+                <a16:creationId xmlns:a16="http://schemas.microsoft.com/office/drawing/2014/main" id="{BF39DD49-8316-CCFC-249F-DA9172E8D9C1}"/>
               </a:ext>
             </a:extLst>
           </p:cNvPr>
@@ -2991,23 +2999,21 @@
           </p:cNvPicPr>
           <p:nvPr/>
         </p:nvPicPr>
-        <p:blipFill>
-          <a:blip r:embed="rId2">
+        <p:blipFill rotWithShape="1">
+          <a:blip>
             <a:extLst>
               <a:ext uri="{28A0092B-C50C-407E-A947-70E740481C1C}">
                 <a14:useLocalDpi xmlns:a14="http://schemas.microsoft.com/office/drawing/2010/main" val="0"/>
               </a:ext>
             </a:extLst>
           </a:blip>
-          <a:srcRect/>
-          <a:stretch>
-            <a:fillRect/>
-          </a:stretch>
+          <a:srcRect t="15318" b="39775"/>
+          <a:stretch/>
         </p:blipFill>
         <p:spPr bwMode="auto">
           <a:xfrm>
-            <a:off x="273154" y="220410"/>
-            <a:ext cx="2638425" cy="1905000"/>
+            <a:off x="0" y="3209662"/>
+            <a:ext cx="12192000" cy="3648338"/>
           </a:xfrm>
           <a:prstGeom prst="rect">
             <a:avLst/>
@@ -3024,6 +3030,429 @@
           </a:extLst>
         </p:spPr>
       </p:pic>
+      <p:grpSp>
+        <p:nvGrpSpPr>
+          <p:cNvPr id="2" name="Group 1">
+            <a:extLst>
+              <a:ext uri="{FF2B5EF4-FFF2-40B4-BE49-F238E27FC236}">
+                <a16:creationId xmlns:a16="http://schemas.microsoft.com/office/drawing/2014/main" id="{28B61149-D9C3-3F6F-19E9-6AFA9594EFAF}"/>
+              </a:ext>
+            </a:extLst>
+          </p:cNvPr>
+          <p:cNvGrpSpPr/>
+          <p:nvPr/>
+        </p:nvGrpSpPr>
+        <p:grpSpPr>
+          <a:xfrm rot="20400000">
+            <a:off x="6981617" y="3193446"/>
+            <a:ext cx="4919912" cy="2566071"/>
+            <a:chOff x="5541263" y="1442459"/>
+            <a:chExt cx="3116524" cy="1625481"/>
+          </a:xfrm>
+        </p:grpSpPr>
+        <p:grpSp>
+          <p:nvGrpSpPr>
+            <p:cNvPr id="5" name="Group 4">
+              <a:extLst>
+                <a:ext uri="{FF2B5EF4-FFF2-40B4-BE49-F238E27FC236}">
+                  <a16:creationId xmlns:a16="http://schemas.microsoft.com/office/drawing/2014/main" id="{CECFEE27-9855-D7D0-85DB-A03F1913DD10}"/>
+                </a:ext>
+              </a:extLst>
+            </p:cNvPr>
+            <p:cNvGrpSpPr/>
+            <p:nvPr/>
+          </p:nvGrpSpPr>
+          <p:grpSpPr>
+            <a:xfrm>
+              <a:off x="5541263" y="1442459"/>
+              <a:ext cx="3116524" cy="1625481"/>
+              <a:chOff x="4366901" y="587880"/>
+              <a:chExt cx="6221338" cy="3244854"/>
+            </a:xfrm>
+          </p:grpSpPr>
+          <p:pic>
+            <p:nvPicPr>
+              <p:cNvPr id="3" name="Picture 2" descr="Blank Admission Ticket Template (5) | PROFESSIONAL TEMPLATES | Raffle  tickets template, Ticket template, Raffle tickets printable">
+                <a:extLst>
+                  <a:ext uri="{FF2B5EF4-FFF2-40B4-BE49-F238E27FC236}">
+                    <a16:creationId xmlns:a16="http://schemas.microsoft.com/office/drawing/2014/main" id="{4826346B-A24F-9711-D381-35227577EB44}"/>
+                  </a:ext>
+                </a:extLst>
+              </p:cNvPr>
+              <p:cNvPicPr>
+                <a:picLocks noChangeAspect="1" noChangeArrowheads="1"/>
+              </p:cNvPicPr>
+              <p:nvPr/>
+            </p:nvPicPr>
+            <p:blipFill rotWithShape="1">
+              <a:blip>
+                <a:duotone>
+                  <a:prstClr val="black"/>
+                  <a:schemeClr val="accent4">
+                    <a:tint val="45000"/>
+                    <a:satMod val="400000"/>
+                  </a:schemeClr>
+                </a:duotone>
+                <a:extLst>
+                  <a:ext uri="{28A0092B-C50C-407E-A947-70E740481C1C}">
+                    <a14:useLocalDpi xmlns:a14="http://schemas.microsoft.com/office/drawing/2010/main" val="0"/>
+                  </a:ext>
+                </a:extLst>
+              </a:blip>
+              <a:srcRect l="3824" t="19028" r="4662" b="19144"/>
+              <a:stretch/>
+            </p:blipFill>
+            <p:spPr bwMode="auto">
+              <a:xfrm>
+                <a:off x="4366901" y="587880"/>
+                <a:ext cx="6221338" cy="3244854"/>
+              </a:xfrm>
+              <a:prstGeom prst="rect">
+                <a:avLst/>
+              </a:prstGeom>
+              <a:noFill/>
+              <a:extLst>
+                <a:ext uri="{909E8E84-426E-40DD-AFC4-6F175D3DCCD1}">
+                  <a14:hiddenFill xmlns:a14="http://schemas.microsoft.com/office/drawing/2010/main">
+                    <a:solidFill>
+                      <a:srgbClr val="FFFFFF"/>
+                    </a:solidFill>
+                  </a14:hiddenFill>
+                </a:ext>
+              </a:extLst>
+            </p:spPr>
+          </p:pic>
+          <p:pic>
+            <p:nvPicPr>
+              <p:cNvPr id="1028" name="Picture 4" descr="Experience Partners — ROAM Beyond">
+                <a:extLst>
+                  <a:ext uri="{FF2B5EF4-FFF2-40B4-BE49-F238E27FC236}">
+                    <a16:creationId xmlns:a16="http://schemas.microsoft.com/office/drawing/2014/main" id="{7895421E-BA98-D633-41DD-10439FC5F7E1}"/>
+                  </a:ext>
+                </a:extLst>
+              </p:cNvPr>
+              <p:cNvPicPr>
+                <a:picLocks noChangeAspect="1" noChangeArrowheads="1"/>
+              </p:cNvPicPr>
+              <p:nvPr/>
+            </p:nvPicPr>
+            <p:blipFill rotWithShape="1">
+              <a:blip>
+                <a:extLst>
+                  <a:ext uri="{28A0092B-C50C-407E-A947-70E740481C1C}">
+                    <a14:useLocalDpi xmlns:a14="http://schemas.microsoft.com/office/drawing/2010/main" val="0"/>
+                  </a:ext>
+                </a:extLst>
+              </a:blip>
+              <a:srcRect l="6761" t="39377" r="5824" b="41184"/>
+              <a:stretch/>
+            </p:blipFill>
+            <p:spPr bwMode="auto">
+              <a:xfrm rot="5400000">
+                <a:off x="8890291" y="1965380"/>
+                <a:ext cx="2204343" cy="489854"/>
+              </a:xfrm>
+              <a:prstGeom prst="rect">
+                <a:avLst/>
+              </a:prstGeom>
+              <a:noFill/>
+              <a:extLst>
+                <a:ext uri="{909E8E84-426E-40DD-AFC4-6F175D3DCCD1}">
+                  <a14:hiddenFill xmlns:a14="http://schemas.microsoft.com/office/drawing/2010/main">
+                    <a:solidFill>
+                      <a:srgbClr val="FFFFFF"/>
+                    </a:solidFill>
+                  </a14:hiddenFill>
+                </a:ext>
+              </a:extLst>
+            </p:spPr>
+          </p:pic>
+        </p:grpSp>
+        <p:sp>
+          <p:nvSpPr>
+            <p:cNvPr id="6" name="TextBox 5">
+              <a:extLst>
+                <a:ext uri="{FF2B5EF4-FFF2-40B4-BE49-F238E27FC236}">
+                  <a16:creationId xmlns:a16="http://schemas.microsoft.com/office/drawing/2014/main" id="{730A7382-1B2B-3020-B2F0-815799FDA46F}"/>
+                </a:ext>
+              </a:extLst>
+            </p:cNvPr>
+            <p:cNvSpPr txBox="1"/>
+            <p:nvPr/>
+          </p:nvSpPr>
+          <p:spPr>
+            <a:xfrm>
+              <a:off x="5888856" y="1879123"/>
+              <a:ext cx="2273181" cy="799342"/>
+            </a:xfrm>
+            <a:prstGeom prst="rect">
+              <a:avLst/>
+            </a:prstGeom>
+            <a:noFill/>
+          </p:spPr>
+          <p:txBody>
+            <a:bodyPr wrap="square" rtlCol="0">
+              <a:spAutoFit/>
+            </a:bodyPr>
+            <a:lstStyle/>
+            <a:p>
+              <a:pPr algn="ctr"/>
+              <a:r>
+                <a:rPr lang="en-US" b="1" dirty="0">
+                  <a:solidFill>
+                    <a:schemeClr val="bg1"/>
+                  </a:solidFill>
+                  <a:latin typeface="Courier New" panose="02070309020205020404" pitchFamily="49" charset="0"/>
+                  <a:cs typeface="Courier New" panose="02070309020205020404" pitchFamily="49" charset="0"/>
+                </a:rPr>
+                <a:t>One Day – One Adult</a:t>
+              </a:r>
+            </a:p>
+            <a:p>
+              <a:pPr algn="ctr"/>
+              <a:r>
+                <a:rPr lang="en-US" b="1" dirty="0">
+                  <a:solidFill>
+                    <a:schemeClr val="bg1"/>
+                  </a:solidFill>
+                  <a:latin typeface="Courier New" panose="02070309020205020404" pitchFamily="49" charset="0"/>
+                  <a:cs typeface="Courier New" panose="02070309020205020404" pitchFamily="49" charset="0"/>
+                </a:rPr>
+                <a:t>Admission</a:t>
+              </a:r>
+            </a:p>
+            <a:p>
+              <a:pPr algn="ctr"/>
+              <a:r>
+                <a:rPr lang="en-US" sz="4000" b="1" dirty="0">
+                  <a:solidFill>
+                    <a:schemeClr val="bg1"/>
+                  </a:solidFill>
+                  <a:latin typeface="Courier New" panose="02070309020205020404" pitchFamily="49" charset="0"/>
+                  <a:cs typeface="Courier New" panose="02070309020205020404" pitchFamily="49" charset="0"/>
+                </a:rPr>
+                <a:t>$81.00</a:t>
+              </a:r>
+            </a:p>
+          </p:txBody>
+        </p:sp>
+      </p:grpSp>
+      <p:sp>
+        <p:nvSpPr>
+          <p:cNvPr id="7" name="Title 6">
+            <a:extLst>
+              <a:ext uri="{FF2B5EF4-FFF2-40B4-BE49-F238E27FC236}">
+                <a16:creationId xmlns:a16="http://schemas.microsoft.com/office/drawing/2014/main" id="{F5702CA6-AA0D-E349-64B7-C69500AC68EA}"/>
+              </a:ext>
+            </a:extLst>
+          </p:cNvPr>
+          <p:cNvSpPr txBox="1">
+            <a:spLocks noGrp="1"/>
+          </p:cNvSpPr>
+          <p:nvPr>
+            <p:ph type="title" idx="4294967295"/>
+          </p:nvPr>
+        </p:nvSpPr>
+        <p:spPr>
+          <a:xfrm>
+            <a:off x="0" y="0"/>
+            <a:ext cx="12192000" cy="1200329"/>
+          </a:xfrm>
+          <a:prstGeom prst="rect">
+            <a:avLst/>
+          </a:prstGeom>
+          <a:noFill/>
+          <a:ln>
+            <a:noFill/>
+            <a:prstDash/>
+          </a:ln>
+          <a:effectLst/>
+        </p:spPr>
+        <p:txBody>
+          <a:bodyPr rot="0" spcFirstLastPara="0" vertOverflow="overflow" horzOverflow="overflow" vert="horz" wrap="square" lIns="91440" tIns="45720" rIns="91440" bIns="45720" numCol="1" spcCol="0" rtlCol="0" fromWordArt="0" anchor="t" anchorCtr="0" forceAA="0" compatLnSpc="1">
+            <a:prstTxWarp prst="textNoShape">
+              <a:avLst/>
+            </a:prstTxWarp>
+            <a:spAutoFit/>
+          </a:bodyPr>
+          <a:lstStyle/>
+          <a:p>
+            <a:pPr marL="0" marR="0" lvl="0" indent="0" algn="ctr" defTabSz="457200" rtl="0" eaLnBrk="1" fontAlgn="auto" latinLnBrk="0" hangingPunct="1">
+              <a:lnSpc>
+                <a:spcPct val="100000"/>
+              </a:lnSpc>
+              <a:spcBef>
+                <a:spcPts val="0"/>
+              </a:spcBef>
+              <a:spcAft>
+                <a:spcPts val="0"/>
+              </a:spcAft>
+              <a:buClrTx/>
+              <a:buSzTx/>
+              <a:buFontTx/>
+              <a:buNone/>
+              <a:tabLst/>
+              <a:defRPr/>
+            </a:pPr>
+            <a:r>
+              <a:rPr kumimoji="0" lang="en-US" sz="7200" b="0" i="0" u="none" strike="noStrike" kern="1200" cap="none" spc="0" normalizeH="0" baseline="0" noProof="0" dirty="0">
+                <a:ln>
+                  <a:noFill/>
+                </a:ln>
+                <a:solidFill>
+                  <a:schemeClr val="accent1">
+                    <a:lumMod val="40000"/>
+                    <a:lumOff val="60000"/>
+                  </a:schemeClr>
+                </a:solidFill>
+                <a:effectLst/>
+                <a:uLnTx/>
+                <a:uFillTx/>
+                <a:latin typeface="Baskerville Old Face" panose="02020602080505020303" pitchFamily="18" charset="0"/>
+                <a:ea typeface="+mn-ea"/>
+                <a:cs typeface="Biome" panose="020B0502040204020203" pitchFamily="34" charset="0"/>
+              </a:rPr>
+              <a:t>Maximizing Pricing Strategy</a:t>
+            </a:r>
+          </a:p>
+        </p:txBody>
+      </p:sp>
+      <p:pic>
+        <p:nvPicPr>
+          <p:cNvPr id="1030" name="Picture 6" descr="No photo description available.">
+            <a:extLst>
+              <a:ext uri="{FF2B5EF4-FFF2-40B4-BE49-F238E27FC236}">
+                <a16:creationId xmlns:a16="http://schemas.microsoft.com/office/drawing/2014/main" id="{D23F4E94-9DE0-2933-89E2-5077833FE5C4}"/>
+              </a:ext>
+            </a:extLst>
+          </p:cNvPr>
+          <p:cNvPicPr>
+            <a:picLocks noChangeAspect="1" noChangeArrowheads="1"/>
+          </p:cNvPicPr>
+          <p:nvPr/>
+        </p:nvPicPr>
+        <p:blipFill rotWithShape="1">
+          <a:blip>
+            <a:extLst>
+              <a:ext uri="{28A0092B-C50C-407E-A947-70E740481C1C}">
+                <a14:useLocalDpi xmlns:a14="http://schemas.microsoft.com/office/drawing/2010/main" val="0"/>
+              </a:ext>
+            </a:extLst>
+          </a:blip>
+          <a:srcRect l="61180" t="12839" r="20283" b="57516"/>
+          <a:stretch/>
+        </p:blipFill>
+        <p:spPr bwMode="auto">
+          <a:xfrm>
+            <a:off x="415588" y="4681563"/>
+            <a:ext cx="1207619" cy="1448478"/>
+          </a:xfrm>
+          <a:prstGeom prst="roundRect">
+            <a:avLst>
+              <a:gd name="adj" fmla="val 4167"/>
+            </a:avLst>
+          </a:prstGeom>
+          <a:solidFill>
+            <a:srgbClr val="FFFFFF"/>
+          </a:solidFill>
+          <a:ln w="76200" cap="sq">
+            <a:solidFill>
+              <a:schemeClr val="accent1"/>
+            </a:solidFill>
+            <a:miter lim="800000"/>
+          </a:ln>
+          <a:effectLst>
+            <a:reflection blurRad="12700" stA="33000" endPos="28000" dist="5000" dir="5400000" sy="-100000" algn="bl" rotWithShape="0"/>
+          </a:effectLst>
+          <a:scene3d>
+            <a:camera prst="orthographicFront"/>
+            <a:lightRig rig="threePt" dir="t">
+              <a:rot lat="0" lon="0" rev="2700000"/>
+            </a:lightRig>
+          </a:scene3d>
+          <a:sp3d contourW="6350">
+            <a:bevelT h="38100"/>
+            <a:contourClr>
+              <a:srgbClr val="C0C0C0"/>
+            </a:contourClr>
+          </a:sp3d>
+        </p:spPr>
+      </p:pic>
+      <p:sp>
+        <p:nvSpPr>
+          <p:cNvPr id="9" name="Rectangle: Rounded Corners 8">
+            <a:extLst>
+              <a:ext uri="{FF2B5EF4-FFF2-40B4-BE49-F238E27FC236}">
+                <a16:creationId xmlns:a16="http://schemas.microsoft.com/office/drawing/2014/main" id="{85E9E240-0DED-4178-423F-7A4483EE79AC}"/>
+              </a:ext>
+            </a:extLst>
+          </p:cNvPr>
+          <p:cNvSpPr/>
+          <p:nvPr/>
+        </p:nvSpPr>
+        <p:spPr>
+          <a:xfrm>
+            <a:off x="1837346" y="4681563"/>
+            <a:ext cx="2615013" cy="1448478"/>
+          </a:xfrm>
+          <a:prstGeom prst="roundRect">
+            <a:avLst/>
+          </a:prstGeom>
+          <a:solidFill>
+            <a:schemeClr val="accent1">
+              <a:lumMod val="60000"/>
+              <a:lumOff val="40000"/>
+            </a:schemeClr>
+          </a:solidFill>
+          <a:ln w="57150">
+            <a:solidFill>
+              <a:schemeClr val="accent1"/>
+            </a:solidFill>
+          </a:ln>
+        </p:spPr>
+        <p:style>
+          <a:lnRef idx="2">
+            <a:schemeClr val="accent1">
+              <a:shade val="50000"/>
+            </a:schemeClr>
+          </a:lnRef>
+          <a:fillRef idx="1">
+            <a:schemeClr val="accent1"/>
+          </a:fillRef>
+          <a:effectRef idx="0">
+            <a:schemeClr val="accent1"/>
+          </a:effectRef>
+          <a:fontRef idx="minor">
+            <a:schemeClr val="lt1"/>
+          </a:fontRef>
+        </p:style>
+        <p:txBody>
+          <a:bodyPr rtlCol="0" anchor="ctr"/>
+          <a:lstStyle/>
+          <a:p>
+            <a:r>
+              <a:rPr lang="en-US" sz="4000" dirty="0">
+                <a:solidFill>
+                  <a:schemeClr val="bg1"/>
+                </a:solidFill>
+                <a:latin typeface="Baskerville Old Face" panose="02020602080505020303" pitchFamily="18" charset="0"/>
+              </a:rPr>
+              <a:t>Marc Kolb</a:t>
+            </a:r>
+          </a:p>
+          <a:p>
+            <a:r>
+              <a:rPr lang="en-US" sz="2800" dirty="0">
+                <a:solidFill>
+                  <a:schemeClr val="bg1"/>
+                </a:solidFill>
+                <a:latin typeface="Baskerville Old Face" panose="02020602080505020303" pitchFamily="18" charset="0"/>
+              </a:rPr>
+              <a:t>Data Scientist</a:t>
+            </a:r>
+          </a:p>
+        </p:txBody>
+      </p:sp>
     </p:spTree>
     <p:extLst>
       <p:ext uri="{BB962C8B-B14F-4D97-AF65-F5344CB8AC3E}">
@@ -3054,10 +3483,1946 @@
           <a:chExt cx="0" cy="0"/>
         </a:xfrm>
       </p:grpSpPr>
+      <p:sp>
+        <p:nvSpPr>
+          <p:cNvPr id="2" name="TextBox 1">
+            <a:extLst>
+              <a:ext uri="{FF2B5EF4-FFF2-40B4-BE49-F238E27FC236}">
+                <a16:creationId xmlns:a16="http://schemas.microsoft.com/office/drawing/2014/main" id="{18670F64-8F31-A1B7-99C0-9E39D94D8D25}"/>
+              </a:ext>
+            </a:extLst>
+          </p:cNvPr>
+          <p:cNvSpPr txBox="1"/>
+          <p:nvPr/>
+        </p:nvSpPr>
+        <p:spPr>
+          <a:xfrm>
+            <a:off x="0" y="0"/>
+            <a:ext cx="12192000" cy="3231654"/>
+          </a:xfrm>
+          <a:prstGeom prst="rect">
+            <a:avLst/>
+          </a:prstGeom>
+          <a:noFill/>
+        </p:spPr>
+        <p:txBody>
+          <a:bodyPr wrap="square" rtlCol="0">
+            <a:spAutoFit/>
+          </a:bodyPr>
+          <a:lstStyle/>
+          <a:p>
+            <a:r>
+              <a:rPr lang="en-US" sz="2400" dirty="0">
+                <a:solidFill>
+                  <a:schemeClr val="accent1">
+                    <a:lumMod val="75000"/>
+                  </a:schemeClr>
+                </a:solidFill>
+                <a:latin typeface="Baskerville Old Face" panose="02020602080505020303" pitchFamily="18" charset="0"/>
+                <a:cs typeface="Biome" panose="020B0502040204020203" pitchFamily="34" charset="0"/>
+              </a:rPr>
+              <a:t>Problem Identification</a:t>
+            </a:r>
+          </a:p>
+          <a:p>
+            <a:pPr algn="ctr"/>
+            <a:r>
+              <a:rPr lang="en-US" sz="3600" u="sng" dirty="0">
+                <a:solidFill>
+                  <a:schemeClr val="accent1">
+                    <a:lumMod val="40000"/>
+                    <a:lumOff val="60000"/>
+                  </a:schemeClr>
+                </a:solidFill>
+                <a:latin typeface="Baskerville Old Face" panose="02020602080505020303" pitchFamily="18" charset="0"/>
+                <a:cs typeface="Biome" panose="020B0502040204020203" pitchFamily="34" charset="0"/>
+              </a:rPr>
+              <a:t>Current Pricing:</a:t>
+            </a:r>
+          </a:p>
+          <a:p>
+            <a:pPr marL="571500" indent="-571500">
+              <a:buFont typeface="Arial" panose="020B0604020202020204" pitchFamily="34" charset="0"/>
+              <a:buChar char="•"/>
+            </a:pPr>
+            <a:r>
+              <a:rPr lang="en-US" sz="4800" dirty="0">
+                <a:latin typeface="Baskerville Old Face" panose="02020602080505020303" pitchFamily="18" charset="0"/>
+                <a:cs typeface="Biome" panose="020B0502040204020203" pitchFamily="34" charset="0"/>
+              </a:rPr>
+              <a:t>Based on Market Average</a:t>
+            </a:r>
+          </a:p>
+          <a:p>
+            <a:pPr marL="571500" indent="-571500">
+              <a:buFont typeface="Arial" panose="020B0604020202020204" pitchFamily="34" charset="0"/>
+              <a:buChar char="•"/>
+            </a:pPr>
+            <a:r>
+              <a:rPr lang="en-US" sz="4800" dirty="0">
+                <a:latin typeface="Baskerville Old Face" panose="02020602080505020303" pitchFamily="18" charset="0"/>
+                <a:cs typeface="Biome" panose="020B0502040204020203" pitchFamily="34" charset="0"/>
+              </a:rPr>
+              <a:t>Not Capitalizing on Premium Facilities</a:t>
+            </a:r>
+          </a:p>
+          <a:p>
+            <a:pPr marL="571500" indent="-571500">
+              <a:buFont typeface="Arial" panose="020B0604020202020204" pitchFamily="34" charset="0"/>
+              <a:buChar char="•"/>
+            </a:pPr>
+            <a:r>
+              <a:rPr lang="en-US" sz="4800" dirty="0">
+                <a:latin typeface="Baskerville Old Face" panose="02020602080505020303" pitchFamily="18" charset="0"/>
+                <a:cs typeface="Biome" panose="020B0502040204020203" pitchFamily="34" charset="0"/>
+              </a:rPr>
+              <a:t>Some Facilities Underutilized</a:t>
+            </a:r>
+          </a:p>
+        </p:txBody>
+      </p:sp>
+      <p:pic>
+        <p:nvPicPr>
+          <p:cNvPr id="5" name="Picture 2" descr="Mountains Snow White - Free image on Pixabay">
+            <a:extLst>
+              <a:ext uri="{FF2B5EF4-FFF2-40B4-BE49-F238E27FC236}">
+                <a16:creationId xmlns:a16="http://schemas.microsoft.com/office/drawing/2014/main" id="{5B234818-CD35-A30D-3B1C-C8503C2B9088}"/>
+              </a:ext>
+            </a:extLst>
+          </p:cNvPr>
+          <p:cNvPicPr>
+            <a:picLocks noChangeAspect="1" noChangeArrowheads="1"/>
+          </p:cNvPicPr>
+          <p:nvPr/>
+        </p:nvPicPr>
+        <p:blipFill rotWithShape="1">
+          <a:blip>
+            <a:extLst>
+              <a:ext uri="{28A0092B-C50C-407E-A947-70E740481C1C}">
+                <a14:useLocalDpi xmlns:a14="http://schemas.microsoft.com/office/drawing/2010/main" val="0"/>
+              </a:ext>
+            </a:extLst>
+          </a:blip>
+          <a:srcRect t="15318" b="39775"/>
+          <a:stretch/>
+        </p:blipFill>
+        <p:spPr bwMode="auto">
+          <a:xfrm>
+            <a:off x="0" y="3209662"/>
+            <a:ext cx="12192000" cy="3648338"/>
+          </a:xfrm>
+          <a:prstGeom prst="rect">
+            <a:avLst/>
+          </a:prstGeom>
+          <a:noFill/>
+          <a:extLst>
+            <a:ext uri="{909E8E84-426E-40DD-AFC4-6F175D3DCCD1}">
+              <a14:hiddenFill xmlns:a14="http://schemas.microsoft.com/office/drawing/2010/main">
+                <a:solidFill>
+                  <a:srgbClr val="FFFFFF"/>
+                </a:solidFill>
+              </a14:hiddenFill>
+            </a:ext>
+          </a:extLst>
+        </p:spPr>
+      </p:pic>
+      <p:grpSp>
+        <p:nvGrpSpPr>
+          <p:cNvPr id="6" name="Group 5">
+            <a:extLst>
+              <a:ext uri="{FF2B5EF4-FFF2-40B4-BE49-F238E27FC236}">
+                <a16:creationId xmlns:a16="http://schemas.microsoft.com/office/drawing/2014/main" id="{B20A6FB7-D053-B20B-7EE0-C23295B44E8D}"/>
+              </a:ext>
+            </a:extLst>
+          </p:cNvPr>
+          <p:cNvGrpSpPr/>
+          <p:nvPr/>
+        </p:nvGrpSpPr>
+        <p:grpSpPr>
+          <a:xfrm rot="20400000">
+            <a:off x="6981617" y="3193446"/>
+            <a:ext cx="4919912" cy="2566071"/>
+            <a:chOff x="5541263" y="1442459"/>
+            <a:chExt cx="3116524" cy="1625481"/>
+          </a:xfrm>
+        </p:grpSpPr>
+        <p:grpSp>
+          <p:nvGrpSpPr>
+            <p:cNvPr id="7" name="Group 6">
+              <a:extLst>
+                <a:ext uri="{FF2B5EF4-FFF2-40B4-BE49-F238E27FC236}">
+                  <a16:creationId xmlns:a16="http://schemas.microsoft.com/office/drawing/2014/main" id="{EB29F1AE-D807-B2A2-3411-28CF7AAF8016}"/>
+                </a:ext>
+              </a:extLst>
+            </p:cNvPr>
+            <p:cNvGrpSpPr/>
+            <p:nvPr/>
+          </p:nvGrpSpPr>
+          <p:grpSpPr>
+            <a:xfrm>
+              <a:off x="5541263" y="1442459"/>
+              <a:ext cx="3116524" cy="1625481"/>
+              <a:chOff x="4366901" y="587880"/>
+              <a:chExt cx="6221338" cy="3244854"/>
+            </a:xfrm>
+          </p:grpSpPr>
+          <p:pic>
+            <p:nvPicPr>
+              <p:cNvPr id="9" name="Picture 8" descr="Blank Admission Ticket Template (5) | PROFESSIONAL TEMPLATES | Raffle  tickets template, Ticket template, Raffle tickets printable">
+                <a:extLst>
+                  <a:ext uri="{FF2B5EF4-FFF2-40B4-BE49-F238E27FC236}">
+                    <a16:creationId xmlns:a16="http://schemas.microsoft.com/office/drawing/2014/main" id="{84EA3BED-B37B-449E-DE78-02ACA50407E9}"/>
+                  </a:ext>
+                </a:extLst>
+              </p:cNvPr>
+              <p:cNvPicPr>
+                <a:picLocks noChangeAspect="1" noChangeArrowheads="1"/>
+              </p:cNvPicPr>
+              <p:nvPr/>
+            </p:nvPicPr>
+            <p:blipFill rotWithShape="1">
+              <a:blip>
+                <a:duotone>
+                  <a:prstClr val="black"/>
+                  <a:schemeClr val="accent4">
+                    <a:tint val="45000"/>
+                    <a:satMod val="400000"/>
+                  </a:schemeClr>
+                </a:duotone>
+                <a:extLst>
+                  <a:ext uri="{28A0092B-C50C-407E-A947-70E740481C1C}">
+                    <a14:useLocalDpi xmlns:a14="http://schemas.microsoft.com/office/drawing/2010/main" val="0"/>
+                  </a:ext>
+                </a:extLst>
+              </a:blip>
+              <a:srcRect l="3824" t="19028" r="4662" b="19144"/>
+              <a:stretch/>
+            </p:blipFill>
+            <p:spPr bwMode="auto">
+              <a:xfrm>
+                <a:off x="4366901" y="587880"/>
+                <a:ext cx="6221338" cy="3244854"/>
+              </a:xfrm>
+              <a:prstGeom prst="rect">
+                <a:avLst/>
+              </a:prstGeom>
+              <a:noFill/>
+              <a:extLst>
+                <a:ext uri="{909E8E84-426E-40DD-AFC4-6F175D3DCCD1}">
+                  <a14:hiddenFill xmlns:a14="http://schemas.microsoft.com/office/drawing/2010/main">
+                    <a:solidFill>
+                      <a:srgbClr val="FFFFFF"/>
+                    </a:solidFill>
+                  </a14:hiddenFill>
+                </a:ext>
+              </a:extLst>
+            </p:spPr>
+          </p:pic>
+          <p:pic>
+            <p:nvPicPr>
+              <p:cNvPr id="10" name="Picture 4" descr="Experience Partners — ROAM Beyond">
+                <a:extLst>
+                  <a:ext uri="{FF2B5EF4-FFF2-40B4-BE49-F238E27FC236}">
+                    <a16:creationId xmlns:a16="http://schemas.microsoft.com/office/drawing/2014/main" id="{620C0047-44F0-9292-F19C-013DE682ED2A}"/>
+                  </a:ext>
+                </a:extLst>
+              </p:cNvPr>
+              <p:cNvPicPr>
+                <a:picLocks noChangeAspect="1" noChangeArrowheads="1"/>
+              </p:cNvPicPr>
+              <p:nvPr/>
+            </p:nvPicPr>
+            <p:blipFill rotWithShape="1">
+              <a:blip>
+                <a:extLst>
+                  <a:ext uri="{28A0092B-C50C-407E-A947-70E740481C1C}">
+                    <a14:useLocalDpi xmlns:a14="http://schemas.microsoft.com/office/drawing/2010/main" val="0"/>
+                  </a:ext>
+                </a:extLst>
+              </a:blip>
+              <a:srcRect l="6761" t="39377" r="5824" b="41184"/>
+              <a:stretch/>
+            </p:blipFill>
+            <p:spPr bwMode="auto">
+              <a:xfrm rot="5400000">
+                <a:off x="8890291" y="1965380"/>
+                <a:ext cx="2204343" cy="489854"/>
+              </a:xfrm>
+              <a:prstGeom prst="rect">
+                <a:avLst/>
+              </a:prstGeom>
+              <a:noFill/>
+              <a:extLst>
+                <a:ext uri="{909E8E84-426E-40DD-AFC4-6F175D3DCCD1}">
+                  <a14:hiddenFill xmlns:a14="http://schemas.microsoft.com/office/drawing/2010/main">
+                    <a:solidFill>
+                      <a:srgbClr val="FFFFFF"/>
+                    </a:solidFill>
+                  </a14:hiddenFill>
+                </a:ext>
+              </a:extLst>
+            </p:spPr>
+          </p:pic>
+        </p:grpSp>
+        <p:sp>
+          <p:nvSpPr>
+            <p:cNvPr id="8" name="TextBox 7">
+              <a:extLst>
+                <a:ext uri="{FF2B5EF4-FFF2-40B4-BE49-F238E27FC236}">
+                  <a16:creationId xmlns:a16="http://schemas.microsoft.com/office/drawing/2014/main" id="{99E4DD4C-F4D5-9BC8-707C-6A0315BC7138}"/>
+                </a:ext>
+              </a:extLst>
+            </p:cNvPr>
+            <p:cNvSpPr txBox="1"/>
+            <p:nvPr/>
+          </p:nvSpPr>
+          <p:spPr>
+            <a:xfrm>
+              <a:off x="5888856" y="1879123"/>
+              <a:ext cx="2273181" cy="799342"/>
+            </a:xfrm>
+            <a:prstGeom prst="rect">
+              <a:avLst/>
+            </a:prstGeom>
+            <a:noFill/>
+          </p:spPr>
+          <p:txBody>
+            <a:bodyPr wrap="square" rtlCol="0">
+              <a:spAutoFit/>
+            </a:bodyPr>
+            <a:lstStyle/>
+            <a:p>
+              <a:pPr algn="ctr"/>
+              <a:r>
+                <a:rPr lang="en-US" b="1" dirty="0">
+                  <a:solidFill>
+                    <a:schemeClr val="bg1"/>
+                  </a:solidFill>
+                  <a:latin typeface="Courier New" panose="02070309020205020404" pitchFamily="49" charset="0"/>
+                  <a:cs typeface="Courier New" panose="02070309020205020404" pitchFamily="49" charset="0"/>
+                </a:rPr>
+                <a:t>One Day – One Adult</a:t>
+              </a:r>
+            </a:p>
+            <a:p>
+              <a:pPr algn="ctr"/>
+              <a:r>
+                <a:rPr lang="en-US" b="1" dirty="0">
+                  <a:solidFill>
+                    <a:schemeClr val="bg1"/>
+                  </a:solidFill>
+                  <a:latin typeface="Courier New" panose="02070309020205020404" pitchFamily="49" charset="0"/>
+                  <a:cs typeface="Courier New" panose="02070309020205020404" pitchFamily="49" charset="0"/>
+                </a:rPr>
+                <a:t>Admission</a:t>
+              </a:r>
+            </a:p>
+            <a:p>
+              <a:pPr algn="ctr"/>
+              <a:r>
+                <a:rPr lang="en-US" sz="4000" b="1" dirty="0">
+                  <a:solidFill>
+                    <a:schemeClr val="bg1"/>
+                  </a:solidFill>
+                  <a:latin typeface="Courier New" panose="02070309020205020404" pitchFamily="49" charset="0"/>
+                  <a:cs typeface="Courier New" panose="02070309020205020404" pitchFamily="49" charset="0"/>
+                </a:rPr>
+                <a:t>$81.00</a:t>
+              </a:r>
+            </a:p>
+          </p:txBody>
+        </p:sp>
+      </p:grpSp>
     </p:spTree>
     <p:extLst>
       <p:ext uri="{BB962C8B-B14F-4D97-AF65-F5344CB8AC3E}">
         <p14:creationId xmlns:p14="http://schemas.microsoft.com/office/powerpoint/2010/main" val="1006101286"/>
+      </p:ext>
+    </p:extLst>
+  </p:cSld>
+  <p:clrMapOvr>
+    <a:masterClrMapping/>
+  </p:clrMapOvr>
+  <p:timing>
+    <p:tnLst>
+      <p:par>
+        <p:cTn id="1" dur="indefinite" restart="never" nodeType="tmRoot">
+          <p:childTnLst>
+            <p:seq concurrent="1" nextAc="seek">
+              <p:cTn id="2" dur="indefinite" nodeType="mainSeq">
+                <p:childTnLst>
+                  <p:par>
+                    <p:cTn id="3" fill="hold">
+                      <p:stCondLst>
+                        <p:cond delay="indefinite"/>
+                      </p:stCondLst>
+                      <p:childTnLst>
+                        <p:par>
+                          <p:cTn id="4" fill="hold">
+                            <p:stCondLst>
+                              <p:cond delay="0"/>
+                            </p:stCondLst>
+                            <p:childTnLst>
+                              <p:par>
+                                <p:cTn id="5" presetID="10" presetClass="entr" presetSubtype="0" fill="hold" nodeType="clickEffect">
+                                  <p:stCondLst>
+                                    <p:cond delay="0"/>
+                                  </p:stCondLst>
+                                  <p:childTnLst>
+                                    <p:set>
+                                      <p:cBhvr>
+                                        <p:cTn id="6" dur="1" fill="hold">
+                                          <p:stCondLst>
+                                            <p:cond delay="0"/>
+                                          </p:stCondLst>
+                                        </p:cTn>
+                                        <p:tgtEl>
+                                          <p:spTgt spid="2">
+                                            <p:txEl>
+                                              <p:pRg st="2" end="2"/>
+                                            </p:txEl>
+                                          </p:spTgt>
+                                        </p:tgtEl>
+                                        <p:attrNameLst>
+                                          <p:attrName>style.visibility</p:attrName>
+                                        </p:attrNameLst>
+                                      </p:cBhvr>
+                                      <p:to>
+                                        <p:strVal val="visible"/>
+                                      </p:to>
+                                    </p:set>
+                                    <p:animEffect transition="in" filter="fade">
+                                      <p:cBhvr>
+                                        <p:cTn id="7" dur="500"/>
+                                        <p:tgtEl>
+                                          <p:spTgt spid="2">
+                                            <p:txEl>
+                                              <p:pRg st="2" end="2"/>
+                                            </p:txEl>
+                                          </p:spTgt>
+                                        </p:tgtEl>
+                                      </p:cBhvr>
+                                    </p:animEffect>
+                                  </p:childTnLst>
+                                </p:cTn>
+                              </p:par>
+                            </p:childTnLst>
+                          </p:cTn>
+                        </p:par>
+                      </p:childTnLst>
+                    </p:cTn>
+                  </p:par>
+                  <p:par>
+                    <p:cTn id="8" fill="hold">
+                      <p:stCondLst>
+                        <p:cond delay="indefinite"/>
+                      </p:stCondLst>
+                      <p:childTnLst>
+                        <p:par>
+                          <p:cTn id="9" fill="hold">
+                            <p:stCondLst>
+                              <p:cond delay="0"/>
+                            </p:stCondLst>
+                            <p:childTnLst>
+                              <p:par>
+                                <p:cTn id="10" presetID="10" presetClass="entr" presetSubtype="0" fill="hold" nodeType="clickEffect">
+                                  <p:stCondLst>
+                                    <p:cond delay="0"/>
+                                  </p:stCondLst>
+                                  <p:childTnLst>
+                                    <p:set>
+                                      <p:cBhvr>
+                                        <p:cTn id="11" dur="1" fill="hold">
+                                          <p:stCondLst>
+                                            <p:cond delay="0"/>
+                                          </p:stCondLst>
+                                        </p:cTn>
+                                        <p:tgtEl>
+                                          <p:spTgt spid="2">
+                                            <p:txEl>
+                                              <p:pRg st="3" end="3"/>
+                                            </p:txEl>
+                                          </p:spTgt>
+                                        </p:tgtEl>
+                                        <p:attrNameLst>
+                                          <p:attrName>style.visibility</p:attrName>
+                                        </p:attrNameLst>
+                                      </p:cBhvr>
+                                      <p:to>
+                                        <p:strVal val="visible"/>
+                                      </p:to>
+                                    </p:set>
+                                    <p:animEffect transition="in" filter="fade">
+                                      <p:cBhvr>
+                                        <p:cTn id="12" dur="500"/>
+                                        <p:tgtEl>
+                                          <p:spTgt spid="2">
+                                            <p:txEl>
+                                              <p:pRg st="3" end="3"/>
+                                            </p:txEl>
+                                          </p:spTgt>
+                                        </p:tgtEl>
+                                      </p:cBhvr>
+                                    </p:animEffect>
+                                  </p:childTnLst>
+                                </p:cTn>
+                              </p:par>
+                            </p:childTnLst>
+                          </p:cTn>
+                        </p:par>
+                      </p:childTnLst>
+                    </p:cTn>
+                  </p:par>
+                  <p:par>
+                    <p:cTn id="13" fill="hold">
+                      <p:stCondLst>
+                        <p:cond delay="indefinite"/>
+                      </p:stCondLst>
+                      <p:childTnLst>
+                        <p:par>
+                          <p:cTn id="14" fill="hold">
+                            <p:stCondLst>
+                              <p:cond delay="0"/>
+                            </p:stCondLst>
+                            <p:childTnLst>
+                              <p:par>
+                                <p:cTn id="15" presetID="10" presetClass="entr" presetSubtype="0" fill="hold" nodeType="clickEffect">
+                                  <p:stCondLst>
+                                    <p:cond delay="0"/>
+                                  </p:stCondLst>
+                                  <p:childTnLst>
+                                    <p:set>
+                                      <p:cBhvr>
+                                        <p:cTn id="16" dur="1" fill="hold">
+                                          <p:stCondLst>
+                                            <p:cond delay="0"/>
+                                          </p:stCondLst>
+                                        </p:cTn>
+                                        <p:tgtEl>
+                                          <p:spTgt spid="2">
+                                            <p:txEl>
+                                              <p:pRg st="4" end="4"/>
+                                            </p:txEl>
+                                          </p:spTgt>
+                                        </p:tgtEl>
+                                        <p:attrNameLst>
+                                          <p:attrName>style.visibility</p:attrName>
+                                        </p:attrNameLst>
+                                      </p:cBhvr>
+                                      <p:to>
+                                        <p:strVal val="visible"/>
+                                      </p:to>
+                                    </p:set>
+                                    <p:animEffect transition="in" filter="fade">
+                                      <p:cBhvr>
+                                        <p:cTn id="17" dur="500"/>
+                                        <p:tgtEl>
+                                          <p:spTgt spid="2">
+                                            <p:txEl>
+                                              <p:pRg st="4" end="4"/>
+                                            </p:txEl>
+                                          </p:spTgt>
+                                        </p:tgtEl>
+                                      </p:cBhvr>
+                                    </p:animEffect>
+                                  </p:childTnLst>
+                                </p:cTn>
+                              </p:par>
+                            </p:childTnLst>
+                          </p:cTn>
+                        </p:par>
+                      </p:childTnLst>
+                    </p:cTn>
+                  </p:par>
+                </p:childTnLst>
+              </p:cTn>
+              <p:prevCondLst>
+                <p:cond evt="onPrev" delay="0">
+                  <p:tgtEl>
+                    <p:sldTgt/>
+                  </p:tgtEl>
+                </p:cond>
+              </p:prevCondLst>
+              <p:nextCondLst>
+                <p:cond evt="onNext" delay="0">
+                  <p:tgtEl>
+                    <p:sldTgt/>
+                  </p:tgtEl>
+                </p:cond>
+              </p:nextCondLst>
+            </p:seq>
+          </p:childTnLst>
+        </p:cTn>
+      </p:par>
+    </p:tnLst>
+  </p:timing>
+</p:sld>
+</file>
+
+<file path=ppt/slides/slide3.xml><?xml version="1.0" encoding="utf-8"?>
+<p:sld xmlns:a="http://schemas.openxmlformats.org/drawingml/2006/main" xmlns:r="http://schemas.openxmlformats.org/officeDocument/2006/relationships" xmlns:p="http://schemas.openxmlformats.org/presentationml/2006/main">
+  <p:cSld>
+    <p:spTree>
+      <p:nvGrpSpPr>
+        <p:cNvPr id="1" name=""/>
+        <p:cNvGrpSpPr/>
+        <p:nvPr/>
+      </p:nvGrpSpPr>
+      <p:grpSpPr>
+        <a:xfrm>
+          <a:off x="0" y="0"/>
+          <a:ext cx="0" cy="0"/>
+          <a:chOff x="0" y="0"/>
+          <a:chExt cx="0" cy="0"/>
+        </a:xfrm>
+      </p:grpSpPr>
+      <p:sp>
+        <p:nvSpPr>
+          <p:cNvPr id="4" name="TextBox 3">
+            <a:extLst>
+              <a:ext uri="{FF2B5EF4-FFF2-40B4-BE49-F238E27FC236}">
+                <a16:creationId xmlns:a16="http://schemas.microsoft.com/office/drawing/2014/main" id="{F6DB14D2-69B8-6B91-C61B-64D8098D1962}"/>
+              </a:ext>
+            </a:extLst>
+          </p:cNvPr>
+          <p:cNvSpPr txBox="1"/>
+          <p:nvPr/>
+        </p:nvSpPr>
+        <p:spPr>
+          <a:xfrm>
+            <a:off x="0" y="0"/>
+            <a:ext cx="12192000" cy="3231654"/>
+          </a:xfrm>
+          <a:prstGeom prst="rect">
+            <a:avLst/>
+          </a:prstGeom>
+          <a:noFill/>
+        </p:spPr>
+        <p:txBody>
+          <a:bodyPr wrap="square" rtlCol="0">
+            <a:spAutoFit/>
+          </a:bodyPr>
+          <a:lstStyle/>
+          <a:p>
+            <a:r>
+              <a:rPr lang="en-US" sz="2400" dirty="0">
+                <a:solidFill>
+                  <a:schemeClr val="accent1">
+                    <a:lumMod val="75000"/>
+                  </a:schemeClr>
+                </a:solidFill>
+                <a:latin typeface="Baskerville Old Face" panose="02020602080505020303" pitchFamily="18" charset="0"/>
+                <a:cs typeface="Biome" panose="020B0502040204020203" pitchFamily="34" charset="0"/>
+              </a:rPr>
+              <a:t>Problem Identification</a:t>
+            </a:r>
+          </a:p>
+          <a:p>
+            <a:pPr algn="ctr"/>
+            <a:r>
+              <a:rPr lang="en-US" sz="3600" u="sng" dirty="0">
+                <a:solidFill>
+                  <a:schemeClr val="accent1">
+                    <a:lumMod val="40000"/>
+                    <a:lumOff val="60000"/>
+                  </a:schemeClr>
+                </a:solidFill>
+                <a:latin typeface="Baskerville Old Face" panose="02020602080505020303" pitchFamily="18" charset="0"/>
+                <a:cs typeface="Biome" panose="020B0502040204020203" pitchFamily="34" charset="0"/>
+              </a:rPr>
+              <a:t>Data-Based Solution:</a:t>
+            </a:r>
+          </a:p>
+          <a:p>
+            <a:pPr marL="571500" indent="-571500">
+              <a:buFont typeface="Arial" panose="020B0604020202020204" pitchFamily="34" charset="0"/>
+              <a:buChar char="•"/>
+            </a:pPr>
+            <a:r>
+              <a:rPr lang="en-US" sz="4800" dirty="0">
+                <a:latin typeface="Baskerville Old Face" panose="02020602080505020303" pitchFamily="18" charset="0"/>
+                <a:cs typeface="Biome" panose="020B0502040204020203" pitchFamily="34" charset="0"/>
+              </a:rPr>
+              <a:t>Optimize Ticket Pricing</a:t>
+            </a:r>
+          </a:p>
+          <a:p>
+            <a:pPr marL="571500" indent="-571500">
+              <a:buFont typeface="Arial" panose="020B0604020202020204" pitchFamily="34" charset="0"/>
+              <a:buChar char="•"/>
+            </a:pPr>
+            <a:r>
+              <a:rPr lang="en-US" sz="4800" dirty="0">
+                <a:latin typeface="Baskerville Old Face" panose="02020602080505020303" pitchFamily="18" charset="0"/>
+                <a:cs typeface="Biome" panose="020B0502040204020203" pitchFamily="34" charset="0"/>
+              </a:rPr>
+              <a:t>Lower Maintenance Costs</a:t>
+            </a:r>
+          </a:p>
+          <a:p>
+            <a:pPr marL="571500" indent="-571500">
+              <a:buFont typeface="Arial" panose="020B0604020202020204" pitchFamily="34" charset="0"/>
+              <a:buChar char="•"/>
+            </a:pPr>
+            <a:r>
+              <a:rPr lang="en-US" sz="4800" dirty="0">
+                <a:latin typeface="Baskerville Old Face" panose="02020602080505020303" pitchFamily="18" charset="0"/>
+                <a:cs typeface="Biome" panose="020B0502040204020203" pitchFamily="34" charset="0"/>
+              </a:rPr>
+              <a:t>Increase Margin</a:t>
+            </a:r>
+          </a:p>
+        </p:txBody>
+      </p:sp>
+      <p:pic>
+        <p:nvPicPr>
+          <p:cNvPr id="5" name="Picture 2" descr="Mountains Snow White - Free image on Pixabay">
+            <a:extLst>
+              <a:ext uri="{FF2B5EF4-FFF2-40B4-BE49-F238E27FC236}">
+                <a16:creationId xmlns:a16="http://schemas.microsoft.com/office/drawing/2014/main" id="{39A9CE6F-537A-F84A-E50B-FE197E020009}"/>
+              </a:ext>
+            </a:extLst>
+          </p:cNvPr>
+          <p:cNvPicPr>
+            <a:picLocks noChangeAspect="1" noChangeArrowheads="1"/>
+          </p:cNvPicPr>
+          <p:nvPr/>
+        </p:nvPicPr>
+        <p:blipFill rotWithShape="1">
+          <a:blip>
+            <a:extLst>
+              <a:ext uri="{28A0092B-C50C-407E-A947-70E740481C1C}">
+                <a14:useLocalDpi xmlns:a14="http://schemas.microsoft.com/office/drawing/2010/main" val="0"/>
+              </a:ext>
+            </a:extLst>
+          </a:blip>
+          <a:srcRect t="15318" b="39775"/>
+          <a:stretch/>
+        </p:blipFill>
+        <p:spPr bwMode="auto">
+          <a:xfrm>
+            <a:off x="0" y="3209662"/>
+            <a:ext cx="12192000" cy="3648338"/>
+          </a:xfrm>
+          <a:prstGeom prst="rect">
+            <a:avLst/>
+          </a:prstGeom>
+          <a:noFill/>
+          <a:extLst>
+            <a:ext uri="{909E8E84-426E-40DD-AFC4-6F175D3DCCD1}">
+              <a14:hiddenFill xmlns:a14="http://schemas.microsoft.com/office/drawing/2010/main">
+                <a:solidFill>
+                  <a:srgbClr val="FFFFFF"/>
+                </a:solidFill>
+              </a14:hiddenFill>
+            </a:ext>
+          </a:extLst>
+        </p:spPr>
+      </p:pic>
+      <p:grpSp>
+        <p:nvGrpSpPr>
+          <p:cNvPr id="6" name="Group 5">
+            <a:extLst>
+              <a:ext uri="{FF2B5EF4-FFF2-40B4-BE49-F238E27FC236}">
+                <a16:creationId xmlns:a16="http://schemas.microsoft.com/office/drawing/2014/main" id="{F7196717-DFF7-8D97-9036-A2622ABE68B4}"/>
+              </a:ext>
+            </a:extLst>
+          </p:cNvPr>
+          <p:cNvGrpSpPr/>
+          <p:nvPr/>
+        </p:nvGrpSpPr>
+        <p:grpSpPr>
+          <a:xfrm rot="20400000">
+            <a:off x="6981617" y="3193446"/>
+            <a:ext cx="4919912" cy="2566071"/>
+            <a:chOff x="5541263" y="1442459"/>
+            <a:chExt cx="3116524" cy="1625481"/>
+          </a:xfrm>
+        </p:grpSpPr>
+        <p:grpSp>
+          <p:nvGrpSpPr>
+            <p:cNvPr id="7" name="Group 6">
+              <a:extLst>
+                <a:ext uri="{FF2B5EF4-FFF2-40B4-BE49-F238E27FC236}">
+                  <a16:creationId xmlns:a16="http://schemas.microsoft.com/office/drawing/2014/main" id="{ECE8CABD-5FA2-6855-10BF-CF84EDCBF738}"/>
+                </a:ext>
+              </a:extLst>
+            </p:cNvPr>
+            <p:cNvGrpSpPr/>
+            <p:nvPr/>
+          </p:nvGrpSpPr>
+          <p:grpSpPr>
+            <a:xfrm>
+              <a:off x="5541263" y="1442459"/>
+              <a:ext cx="3116524" cy="1625481"/>
+              <a:chOff x="4366901" y="587880"/>
+              <a:chExt cx="6221338" cy="3244854"/>
+            </a:xfrm>
+          </p:grpSpPr>
+          <p:pic>
+            <p:nvPicPr>
+              <p:cNvPr id="9" name="Picture 8" descr="Blank Admission Ticket Template (5) | PROFESSIONAL TEMPLATES | Raffle  tickets template, Ticket template, Raffle tickets printable">
+                <a:extLst>
+                  <a:ext uri="{FF2B5EF4-FFF2-40B4-BE49-F238E27FC236}">
+                    <a16:creationId xmlns:a16="http://schemas.microsoft.com/office/drawing/2014/main" id="{53DB5206-11E4-E3AE-E7DE-E83A9B12DE44}"/>
+                  </a:ext>
+                </a:extLst>
+              </p:cNvPr>
+              <p:cNvPicPr>
+                <a:picLocks noChangeAspect="1" noChangeArrowheads="1"/>
+              </p:cNvPicPr>
+              <p:nvPr/>
+            </p:nvPicPr>
+            <p:blipFill rotWithShape="1">
+              <a:blip>
+                <a:duotone>
+                  <a:prstClr val="black"/>
+                  <a:schemeClr val="accent4">
+                    <a:tint val="45000"/>
+                    <a:satMod val="400000"/>
+                  </a:schemeClr>
+                </a:duotone>
+                <a:extLst>
+                  <a:ext uri="{28A0092B-C50C-407E-A947-70E740481C1C}">
+                    <a14:useLocalDpi xmlns:a14="http://schemas.microsoft.com/office/drawing/2010/main" val="0"/>
+                  </a:ext>
+                </a:extLst>
+              </a:blip>
+              <a:srcRect l="3824" t="19028" r="4662" b="19144"/>
+              <a:stretch/>
+            </p:blipFill>
+            <p:spPr bwMode="auto">
+              <a:xfrm>
+                <a:off x="4366901" y="587880"/>
+                <a:ext cx="6221338" cy="3244854"/>
+              </a:xfrm>
+              <a:prstGeom prst="rect">
+                <a:avLst/>
+              </a:prstGeom>
+              <a:noFill/>
+              <a:extLst>
+                <a:ext uri="{909E8E84-426E-40DD-AFC4-6F175D3DCCD1}">
+                  <a14:hiddenFill xmlns:a14="http://schemas.microsoft.com/office/drawing/2010/main">
+                    <a:solidFill>
+                      <a:srgbClr val="FFFFFF"/>
+                    </a:solidFill>
+                  </a14:hiddenFill>
+                </a:ext>
+              </a:extLst>
+            </p:spPr>
+          </p:pic>
+          <p:pic>
+            <p:nvPicPr>
+              <p:cNvPr id="10" name="Picture 4" descr="Experience Partners — ROAM Beyond">
+                <a:extLst>
+                  <a:ext uri="{FF2B5EF4-FFF2-40B4-BE49-F238E27FC236}">
+                    <a16:creationId xmlns:a16="http://schemas.microsoft.com/office/drawing/2014/main" id="{DD7B3AB3-36F4-10B5-B04F-DB3D16B1825E}"/>
+                  </a:ext>
+                </a:extLst>
+              </p:cNvPr>
+              <p:cNvPicPr>
+                <a:picLocks noChangeAspect="1" noChangeArrowheads="1"/>
+              </p:cNvPicPr>
+              <p:nvPr/>
+            </p:nvPicPr>
+            <p:blipFill rotWithShape="1">
+              <a:blip>
+                <a:extLst>
+                  <a:ext uri="{28A0092B-C50C-407E-A947-70E740481C1C}">
+                    <a14:useLocalDpi xmlns:a14="http://schemas.microsoft.com/office/drawing/2010/main" val="0"/>
+                  </a:ext>
+                </a:extLst>
+              </a:blip>
+              <a:srcRect l="6761" t="39377" r="5824" b="41184"/>
+              <a:stretch/>
+            </p:blipFill>
+            <p:spPr bwMode="auto">
+              <a:xfrm rot="5400000">
+                <a:off x="8890291" y="1965380"/>
+                <a:ext cx="2204343" cy="489854"/>
+              </a:xfrm>
+              <a:prstGeom prst="rect">
+                <a:avLst/>
+              </a:prstGeom>
+              <a:noFill/>
+              <a:extLst>
+                <a:ext uri="{909E8E84-426E-40DD-AFC4-6F175D3DCCD1}">
+                  <a14:hiddenFill xmlns:a14="http://schemas.microsoft.com/office/drawing/2010/main">
+                    <a:solidFill>
+                      <a:srgbClr val="FFFFFF"/>
+                    </a:solidFill>
+                  </a14:hiddenFill>
+                </a:ext>
+              </a:extLst>
+            </p:spPr>
+          </p:pic>
+        </p:grpSp>
+        <p:sp>
+          <p:nvSpPr>
+            <p:cNvPr id="8" name="TextBox 7">
+              <a:extLst>
+                <a:ext uri="{FF2B5EF4-FFF2-40B4-BE49-F238E27FC236}">
+                  <a16:creationId xmlns:a16="http://schemas.microsoft.com/office/drawing/2014/main" id="{5D7D03BE-955B-C144-172C-1623FAF32CB3}"/>
+                </a:ext>
+              </a:extLst>
+            </p:cNvPr>
+            <p:cNvSpPr txBox="1"/>
+            <p:nvPr/>
+          </p:nvSpPr>
+          <p:spPr>
+            <a:xfrm>
+              <a:off x="5888856" y="1879123"/>
+              <a:ext cx="2273181" cy="799342"/>
+            </a:xfrm>
+            <a:prstGeom prst="rect">
+              <a:avLst/>
+            </a:prstGeom>
+            <a:noFill/>
+          </p:spPr>
+          <p:txBody>
+            <a:bodyPr wrap="square" rtlCol="0">
+              <a:spAutoFit/>
+            </a:bodyPr>
+            <a:lstStyle/>
+            <a:p>
+              <a:pPr algn="ctr"/>
+              <a:r>
+                <a:rPr lang="en-US" b="1" dirty="0">
+                  <a:solidFill>
+                    <a:schemeClr val="bg1"/>
+                  </a:solidFill>
+                  <a:latin typeface="Courier New" panose="02070309020205020404" pitchFamily="49" charset="0"/>
+                  <a:cs typeface="Courier New" panose="02070309020205020404" pitchFamily="49" charset="0"/>
+                </a:rPr>
+                <a:t>One Day – One Adult</a:t>
+              </a:r>
+            </a:p>
+            <a:p>
+              <a:pPr algn="ctr"/>
+              <a:r>
+                <a:rPr lang="en-US" b="1" dirty="0">
+                  <a:solidFill>
+                    <a:schemeClr val="bg1"/>
+                  </a:solidFill>
+                  <a:latin typeface="Courier New" panose="02070309020205020404" pitchFamily="49" charset="0"/>
+                  <a:cs typeface="Courier New" panose="02070309020205020404" pitchFamily="49" charset="0"/>
+                </a:rPr>
+                <a:t>Admission</a:t>
+              </a:r>
+            </a:p>
+            <a:p>
+              <a:pPr algn="ctr"/>
+              <a:r>
+                <a:rPr lang="en-US" sz="4000" b="1" dirty="0">
+                  <a:solidFill>
+                    <a:schemeClr val="bg1"/>
+                  </a:solidFill>
+                  <a:latin typeface="Courier New" panose="02070309020205020404" pitchFamily="49" charset="0"/>
+                  <a:cs typeface="Courier New" panose="02070309020205020404" pitchFamily="49" charset="0"/>
+                </a:rPr>
+                <a:t>$81.00</a:t>
+              </a:r>
+            </a:p>
+          </p:txBody>
+        </p:sp>
+      </p:grpSp>
+    </p:spTree>
+    <p:extLst>
+      <p:ext uri="{BB962C8B-B14F-4D97-AF65-F5344CB8AC3E}">
+        <p14:creationId xmlns:p14="http://schemas.microsoft.com/office/powerpoint/2010/main" val="4286485435"/>
+      </p:ext>
+    </p:extLst>
+  </p:cSld>
+  <p:clrMapOvr>
+    <a:masterClrMapping/>
+  </p:clrMapOvr>
+  <p:timing>
+    <p:tnLst>
+      <p:par>
+        <p:cTn id="1" dur="indefinite" restart="never" nodeType="tmRoot">
+          <p:childTnLst>
+            <p:seq concurrent="1" nextAc="seek">
+              <p:cTn id="2" dur="indefinite" nodeType="mainSeq">
+                <p:childTnLst>
+                  <p:par>
+                    <p:cTn id="3" fill="hold">
+                      <p:stCondLst>
+                        <p:cond delay="indefinite"/>
+                      </p:stCondLst>
+                      <p:childTnLst>
+                        <p:par>
+                          <p:cTn id="4" fill="hold">
+                            <p:stCondLst>
+                              <p:cond delay="0"/>
+                            </p:stCondLst>
+                            <p:childTnLst>
+                              <p:par>
+                                <p:cTn id="5" presetID="10" presetClass="entr" presetSubtype="0" fill="hold" nodeType="clickEffect">
+                                  <p:stCondLst>
+                                    <p:cond delay="0"/>
+                                  </p:stCondLst>
+                                  <p:childTnLst>
+                                    <p:set>
+                                      <p:cBhvr>
+                                        <p:cTn id="6" dur="1" fill="hold">
+                                          <p:stCondLst>
+                                            <p:cond delay="0"/>
+                                          </p:stCondLst>
+                                        </p:cTn>
+                                        <p:tgtEl>
+                                          <p:spTgt spid="4">
+                                            <p:txEl>
+                                              <p:pRg st="2" end="2"/>
+                                            </p:txEl>
+                                          </p:spTgt>
+                                        </p:tgtEl>
+                                        <p:attrNameLst>
+                                          <p:attrName>style.visibility</p:attrName>
+                                        </p:attrNameLst>
+                                      </p:cBhvr>
+                                      <p:to>
+                                        <p:strVal val="visible"/>
+                                      </p:to>
+                                    </p:set>
+                                    <p:animEffect transition="in" filter="fade">
+                                      <p:cBhvr>
+                                        <p:cTn id="7" dur="500"/>
+                                        <p:tgtEl>
+                                          <p:spTgt spid="4">
+                                            <p:txEl>
+                                              <p:pRg st="2" end="2"/>
+                                            </p:txEl>
+                                          </p:spTgt>
+                                        </p:tgtEl>
+                                      </p:cBhvr>
+                                    </p:animEffect>
+                                  </p:childTnLst>
+                                </p:cTn>
+                              </p:par>
+                            </p:childTnLst>
+                          </p:cTn>
+                        </p:par>
+                      </p:childTnLst>
+                    </p:cTn>
+                  </p:par>
+                  <p:par>
+                    <p:cTn id="8" fill="hold">
+                      <p:stCondLst>
+                        <p:cond delay="indefinite"/>
+                      </p:stCondLst>
+                      <p:childTnLst>
+                        <p:par>
+                          <p:cTn id="9" fill="hold">
+                            <p:stCondLst>
+                              <p:cond delay="0"/>
+                            </p:stCondLst>
+                            <p:childTnLst>
+                              <p:par>
+                                <p:cTn id="10" presetID="10" presetClass="entr" presetSubtype="0" fill="hold" nodeType="clickEffect">
+                                  <p:stCondLst>
+                                    <p:cond delay="0"/>
+                                  </p:stCondLst>
+                                  <p:childTnLst>
+                                    <p:set>
+                                      <p:cBhvr>
+                                        <p:cTn id="11" dur="1" fill="hold">
+                                          <p:stCondLst>
+                                            <p:cond delay="0"/>
+                                          </p:stCondLst>
+                                        </p:cTn>
+                                        <p:tgtEl>
+                                          <p:spTgt spid="4">
+                                            <p:txEl>
+                                              <p:pRg st="3" end="3"/>
+                                            </p:txEl>
+                                          </p:spTgt>
+                                        </p:tgtEl>
+                                        <p:attrNameLst>
+                                          <p:attrName>style.visibility</p:attrName>
+                                        </p:attrNameLst>
+                                      </p:cBhvr>
+                                      <p:to>
+                                        <p:strVal val="visible"/>
+                                      </p:to>
+                                    </p:set>
+                                    <p:animEffect transition="in" filter="fade">
+                                      <p:cBhvr>
+                                        <p:cTn id="12" dur="500"/>
+                                        <p:tgtEl>
+                                          <p:spTgt spid="4">
+                                            <p:txEl>
+                                              <p:pRg st="3" end="3"/>
+                                            </p:txEl>
+                                          </p:spTgt>
+                                        </p:tgtEl>
+                                      </p:cBhvr>
+                                    </p:animEffect>
+                                  </p:childTnLst>
+                                </p:cTn>
+                              </p:par>
+                            </p:childTnLst>
+                          </p:cTn>
+                        </p:par>
+                      </p:childTnLst>
+                    </p:cTn>
+                  </p:par>
+                  <p:par>
+                    <p:cTn id="13" fill="hold">
+                      <p:stCondLst>
+                        <p:cond delay="indefinite"/>
+                      </p:stCondLst>
+                      <p:childTnLst>
+                        <p:par>
+                          <p:cTn id="14" fill="hold">
+                            <p:stCondLst>
+                              <p:cond delay="0"/>
+                            </p:stCondLst>
+                            <p:childTnLst>
+                              <p:par>
+                                <p:cTn id="15" presetID="10" presetClass="entr" presetSubtype="0" fill="hold" nodeType="clickEffect">
+                                  <p:stCondLst>
+                                    <p:cond delay="0"/>
+                                  </p:stCondLst>
+                                  <p:childTnLst>
+                                    <p:set>
+                                      <p:cBhvr>
+                                        <p:cTn id="16" dur="1" fill="hold">
+                                          <p:stCondLst>
+                                            <p:cond delay="0"/>
+                                          </p:stCondLst>
+                                        </p:cTn>
+                                        <p:tgtEl>
+                                          <p:spTgt spid="4">
+                                            <p:txEl>
+                                              <p:pRg st="4" end="4"/>
+                                            </p:txEl>
+                                          </p:spTgt>
+                                        </p:tgtEl>
+                                        <p:attrNameLst>
+                                          <p:attrName>style.visibility</p:attrName>
+                                        </p:attrNameLst>
+                                      </p:cBhvr>
+                                      <p:to>
+                                        <p:strVal val="visible"/>
+                                      </p:to>
+                                    </p:set>
+                                    <p:animEffect transition="in" filter="fade">
+                                      <p:cBhvr>
+                                        <p:cTn id="17" dur="500"/>
+                                        <p:tgtEl>
+                                          <p:spTgt spid="4">
+                                            <p:txEl>
+                                              <p:pRg st="4" end="4"/>
+                                            </p:txEl>
+                                          </p:spTgt>
+                                        </p:tgtEl>
+                                      </p:cBhvr>
+                                    </p:animEffect>
+                                  </p:childTnLst>
+                                </p:cTn>
+                              </p:par>
+                            </p:childTnLst>
+                          </p:cTn>
+                        </p:par>
+                      </p:childTnLst>
+                    </p:cTn>
+                  </p:par>
+                </p:childTnLst>
+              </p:cTn>
+              <p:prevCondLst>
+                <p:cond evt="onPrev" delay="0">
+                  <p:tgtEl>
+                    <p:sldTgt/>
+                  </p:tgtEl>
+                </p:cond>
+              </p:prevCondLst>
+              <p:nextCondLst>
+                <p:cond evt="onNext" delay="0">
+                  <p:tgtEl>
+                    <p:sldTgt/>
+                  </p:tgtEl>
+                </p:cond>
+              </p:nextCondLst>
+            </p:seq>
+          </p:childTnLst>
+        </p:cTn>
+      </p:par>
+    </p:tnLst>
+  </p:timing>
+</p:sld>
+</file>
+
+<file path=ppt/slides/slide4.xml><?xml version="1.0" encoding="utf-8"?>
+<p:sld xmlns:a="http://schemas.openxmlformats.org/drawingml/2006/main" xmlns:r="http://schemas.openxmlformats.org/officeDocument/2006/relationships" xmlns:p="http://schemas.openxmlformats.org/presentationml/2006/main">
+  <p:cSld>
+    <p:spTree>
+      <p:nvGrpSpPr>
+        <p:cNvPr id="1" name=""/>
+        <p:cNvGrpSpPr/>
+        <p:nvPr/>
+      </p:nvGrpSpPr>
+      <p:grpSpPr>
+        <a:xfrm>
+          <a:off x="0" y="0"/>
+          <a:ext cx="0" cy="0"/>
+          <a:chOff x="0" y="0"/>
+          <a:chExt cx="0" cy="0"/>
+        </a:xfrm>
+      </p:grpSpPr>
+      <p:sp>
+        <p:nvSpPr>
+          <p:cNvPr id="2" name="TextBox 1">
+            <a:extLst>
+              <a:ext uri="{FF2B5EF4-FFF2-40B4-BE49-F238E27FC236}">
+                <a16:creationId xmlns:a16="http://schemas.microsoft.com/office/drawing/2014/main" id="{BB2908F7-044E-4E28-C48B-06A5A395414C}"/>
+              </a:ext>
+            </a:extLst>
+          </p:cNvPr>
+          <p:cNvSpPr txBox="1"/>
+          <p:nvPr/>
+        </p:nvSpPr>
+        <p:spPr>
+          <a:xfrm>
+            <a:off x="0" y="0"/>
+            <a:ext cx="12192000" cy="3231654"/>
+          </a:xfrm>
+          <a:prstGeom prst="rect">
+            <a:avLst/>
+          </a:prstGeom>
+          <a:noFill/>
+        </p:spPr>
+        <p:txBody>
+          <a:bodyPr wrap="square" rtlCol="0">
+            <a:spAutoFit/>
+          </a:bodyPr>
+          <a:lstStyle/>
+          <a:p>
+            <a:r>
+              <a:rPr lang="en-US" sz="2400" dirty="0">
+                <a:solidFill>
+                  <a:schemeClr val="accent1">
+                    <a:lumMod val="75000"/>
+                  </a:schemeClr>
+                </a:solidFill>
+                <a:latin typeface="Baskerville Old Face" panose="02020602080505020303" pitchFamily="18" charset="0"/>
+                <a:cs typeface="Biome" panose="020B0502040204020203" pitchFamily="34" charset="0"/>
+              </a:rPr>
+              <a:t>Recommendations and Key Findings</a:t>
+            </a:r>
+          </a:p>
+          <a:p>
+            <a:pPr algn="ctr"/>
+            <a:r>
+              <a:rPr lang="en-US" sz="3600" u="sng" dirty="0">
+                <a:solidFill>
+                  <a:schemeClr val="accent1">
+                    <a:lumMod val="40000"/>
+                    <a:lumOff val="60000"/>
+                  </a:schemeClr>
+                </a:solidFill>
+                <a:latin typeface="Baskerville Old Face" panose="02020602080505020303" pitchFamily="18" charset="0"/>
+                <a:cs typeface="Biome" panose="020B0502040204020203" pitchFamily="34" charset="0"/>
+              </a:rPr>
+              <a:t>Recommendations:</a:t>
+            </a:r>
+          </a:p>
+          <a:p>
+            <a:pPr marL="571500" indent="-571500">
+              <a:buFont typeface="Arial" panose="020B0604020202020204" pitchFamily="34" charset="0"/>
+              <a:buChar char="•"/>
+            </a:pPr>
+            <a:r>
+              <a:rPr lang="en-US" sz="4800" dirty="0">
+                <a:latin typeface="Baskerville Old Face" panose="02020602080505020303" pitchFamily="18" charset="0"/>
+                <a:cs typeface="Biome" panose="020B0502040204020203" pitchFamily="34" charset="0"/>
+              </a:rPr>
+              <a:t>Increase Base Ticket Price to $95.87</a:t>
+            </a:r>
+          </a:p>
+          <a:p>
+            <a:pPr marL="571500" indent="-571500">
+              <a:buFont typeface="Arial" panose="020B0604020202020204" pitchFamily="34" charset="0"/>
+              <a:buChar char="•"/>
+            </a:pPr>
+            <a:r>
+              <a:rPr lang="en-US" sz="4800" dirty="0">
+                <a:latin typeface="Baskerville Old Face" panose="02020602080505020303" pitchFamily="18" charset="0"/>
+                <a:cs typeface="Biome" panose="020B0502040204020203" pitchFamily="34" charset="0"/>
+              </a:rPr>
+              <a:t>Close Five of the Least Used Runs</a:t>
+            </a:r>
+          </a:p>
+          <a:p>
+            <a:pPr marL="571500" indent="-571500">
+              <a:buFont typeface="Arial" panose="020B0604020202020204" pitchFamily="34" charset="0"/>
+              <a:buChar char="•"/>
+            </a:pPr>
+            <a:r>
+              <a:rPr lang="en-US" sz="4800" dirty="0">
+                <a:latin typeface="Baskerville Old Face" panose="02020602080505020303" pitchFamily="18" charset="0"/>
+                <a:cs typeface="Biome" panose="020B0502040204020203" pitchFamily="34" charset="0"/>
+              </a:rPr>
+              <a:t>Increase Vertical Drop by 150 Feet</a:t>
+            </a:r>
+          </a:p>
+        </p:txBody>
+      </p:sp>
+      <p:pic>
+        <p:nvPicPr>
+          <p:cNvPr id="3" name="Picture 2" descr="Mountains Snow White - Free image on Pixabay">
+            <a:extLst>
+              <a:ext uri="{FF2B5EF4-FFF2-40B4-BE49-F238E27FC236}">
+                <a16:creationId xmlns:a16="http://schemas.microsoft.com/office/drawing/2014/main" id="{35CCB56E-1192-907D-BC47-EE8F4DDB4312}"/>
+              </a:ext>
+            </a:extLst>
+          </p:cNvPr>
+          <p:cNvPicPr>
+            <a:picLocks noChangeAspect="1" noChangeArrowheads="1"/>
+          </p:cNvPicPr>
+          <p:nvPr/>
+        </p:nvPicPr>
+        <p:blipFill rotWithShape="1">
+          <a:blip>
+            <a:extLst>
+              <a:ext uri="{28A0092B-C50C-407E-A947-70E740481C1C}">
+                <a14:useLocalDpi xmlns:a14="http://schemas.microsoft.com/office/drawing/2010/main" val="0"/>
+              </a:ext>
+            </a:extLst>
+          </a:blip>
+          <a:srcRect t="15318" b="39775"/>
+          <a:stretch/>
+        </p:blipFill>
+        <p:spPr bwMode="auto">
+          <a:xfrm>
+            <a:off x="0" y="3209662"/>
+            <a:ext cx="12192000" cy="3648338"/>
+          </a:xfrm>
+          <a:prstGeom prst="rect">
+            <a:avLst/>
+          </a:prstGeom>
+          <a:noFill/>
+          <a:extLst>
+            <a:ext uri="{909E8E84-426E-40DD-AFC4-6F175D3DCCD1}">
+              <a14:hiddenFill xmlns:a14="http://schemas.microsoft.com/office/drawing/2010/main">
+                <a:solidFill>
+                  <a:srgbClr val="FFFFFF"/>
+                </a:solidFill>
+              </a14:hiddenFill>
+            </a:ext>
+          </a:extLst>
+        </p:spPr>
+      </p:pic>
+      <p:grpSp>
+        <p:nvGrpSpPr>
+          <p:cNvPr id="9" name="Group 8">
+            <a:extLst>
+              <a:ext uri="{FF2B5EF4-FFF2-40B4-BE49-F238E27FC236}">
+                <a16:creationId xmlns:a16="http://schemas.microsoft.com/office/drawing/2014/main" id="{F3CF1764-5913-DF9F-01F9-C8D640AB9992}"/>
+              </a:ext>
+            </a:extLst>
+          </p:cNvPr>
+          <p:cNvGrpSpPr/>
+          <p:nvPr/>
+        </p:nvGrpSpPr>
+        <p:grpSpPr>
+          <a:xfrm rot="20400000">
+            <a:off x="6981617" y="3193446"/>
+            <a:ext cx="4919912" cy="2566071"/>
+            <a:chOff x="5541263" y="1442459"/>
+            <a:chExt cx="3116524" cy="1625481"/>
+          </a:xfrm>
+        </p:grpSpPr>
+        <p:grpSp>
+          <p:nvGrpSpPr>
+            <p:cNvPr id="10" name="Group 9">
+              <a:extLst>
+                <a:ext uri="{FF2B5EF4-FFF2-40B4-BE49-F238E27FC236}">
+                  <a16:creationId xmlns:a16="http://schemas.microsoft.com/office/drawing/2014/main" id="{C00575F5-4E8B-AB60-3BD3-E516C8EFCEDC}"/>
+                </a:ext>
+              </a:extLst>
+            </p:cNvPr>
+            <p:cNvGrpSpPr/>
+            <p:nvPr/>
+          </p:nvGrpSpPr>
+          <p:grpSpPr>
+            <a:xfrm>
+              <a:off x="5541263" y="1442459"/>
+              <a:ext cx="3116524" cy="1625481"/>
+              <a:chOff x="4366901" y="587880"/>
+              <a:chExt cx="6221338" cy="3244854"/>
+            </a:xfrm>
+          </p:grpSpPr>
+          <p:pic>
+            <p:nvPicPr>
+              <p:cNvPr id="12" name="Picture 11" descr="Blank Admission Ticket Template (5) | PROFESSIONAL TEMPLATES | Raffle  tickets template, Ticket template, Raffle tickets printable">
+                <a:extLst>
+                  <a:ext uri="{FF2B5EF4-FFF2-40B4-BE49-F238E27FC236}">
+                    <a16:creationId xmlns:a16="http://schemas.microsoft.com/office/drawing/2014/main" id="{D95DDCF2-95BB-F347-EB6B-2CA95819CF6F}"/>
+                  </a:ext>
+                </a:extLst>
+              </p:cNvPr>
+              <p:cNvPicPr>
+                <a:picLocks noChangeAspect="1" noChangeArrowheads="1"/>
+              </p:cNvPicPr>
+              <p:nvPr/>
+            </p:nvPicPr>
+            <p:blipFill rotWithShape="1">
+              <a:blip>
+                <a:duotone>
+                  <a:prstClr val="black"/>
+                  <a:schemeClr val="accent4">
+                    <a:tint val="45000"/>
+                    <a:satMod val="400000"/>
+                  </a:schemeClr>
+                </a:duotone>
+                <a:extLst>
+                  <a:ext uri="{28A0092B-C50C-407E-A947-70E740481C1C}">
+                    <a14:useLocalDpi xmlns:a14="http://schemas.microsoft.com/office/drawing/2010/main" val="0"/>
+                  </a:ext>
+                </a:extLst>
+              </a:blip>
+              <a:srcRect l="3824" t="19028" r="4662" b="19144"/>
+              <a:stretch/>
+            </p:blipFill>
+            <p:spPr bwMode="auto">
+              <a:xfrm>
+                <a:off x="4366901" y="587880"/>
+                <a:ext cx="6221338" cy="3244854"/>
+              </a:xfrm>
+              <a:prstGeom prst="rect">
+                <a:avLst/>
+              </a:prstGeom>
+              <a:noFill/>
+              <a:extLst>
+                <a:ext uri="{909E8E84-426E-40DD-AFC4-6F175D3DCCD1}">
+                  <a14:hiddenFill xmlns:a14="http://schemas.microsoft.com/office/drawing/2010/main">
+                    <a:solidFill>
+                      <a:srgbClr val="FFFFFF"/>
+                    </a:solidFill>
+                  </a14:hiddenFill>
+                </a:ext>
+              </a:extLst>
+            </p:spPr>
+          </p:pic>
+          <p:pic>
+            <p:nvPicPr>
+              <p:cNvPr id="13" name="Picture 4" descr="Experience Partners — ROAM Beyond">
+                <a:extLst>
+                  <a:ext uri="{FF2B5EF4-FFF2-40B4-BE49-F238E27FC236}">
+                    <a16:creationId xmlns:a16="http://schemas.microsoft.com/office/drawing/2014/main" id="{02570CC8-79AB-7F8E-71B8-782A7E2E24B9}"/>
+                  </a:ext>
+                </a:extLst>
+              </p:cNvPr>
+              <p:cNvPicPr>
+                <a:picLocks noChangeAspect="1" noChangeArrowheads="1"/>
+              </p:cNvPicPr>
+              <p:nvPr/>
+            </p:nvPicPr>
+            <p:blipFill rotWithShape="1">
+              <a:blip>
+                <a:extLst>
+                  <a:ext uri="{28A0092B-C50C-407E-A947-70E740481C1C}">
+                    <a14:useLocalDpi xmlns:a14="http://schemas.microsoft.com/office/drawing/2010/main" val="0"/>
+                  </a:ext>
+                </a:extLst>
+              </a:blip>
+              <a:srcRect l="6761" t="39377" r="5824" b="41184"/>
+              <a:stretch/>
+            </p:blipFill>
+            <p:spPr bwMode="auto">
+              <a:xfrm rot="5400000">
+                <a:off x="8890291" y="1965380"/>
+                <a:ext cx="2204343" cy="489854"/>
+              </a:xfrm>
+              <a:prstGeom prst="rect">
+                <a:avLst/>
+              </a:prstGeom>
+              <a:noFill/>
+              <a:extLst>
+                <a:ext uri="{909E8E84-426E-40DD-AFC4-6F175D3DCCD1}">
+                  <a14:hiddenFill xmlns:a14="http://schemas.microsoft.com/office/drawing/2010/main">
+                    <a:solidFill>
+                      <a:srgbClr val="FFFFFF"/>
+                    </a:solidFill>
+                  </a14:hiddenFill>
+                </a:ext>
+              </a:extLst>
+            </p:spPr>
+          </p:pic>
+        </p:grpSp>
+        <p:sp>
+          <p:nvSpPr>
+            <p:cNvPr id="11" name="TextBox 10">
+              <a:extLst>
+                <a:ext uri="{FF2B5EF4-FFF2-40B4-BE49-F238E27FC236}">
+                  <a16:creationId xmlns:a16="http://schemas.microsoft.com/office/drawing/2014/main" id="{33AD494B-123D-4230-BC5D-9CC4ACA1783A}"/>
+                </a:ext>
+              </a:extLst>
+            </p:cNvPr>
+            <p:cNvSpPr txBox="1"/>
+            <p:nvPr/>
+          </p:nvSpPr>
+          <p:spPr>
+            <a:xfrm>
+              <a:off x="5888856" y="1879123"/>
+              <a:ext cx="2273181" cy="799342"/>
+            </a:xfrm>
+            <a:prstGeom prst="rect">
+              <a:avLst/>
+            </a:prstGeom>
+            <a:noFill/>
+          </p:spPr>
+          <p:txBody>
+            <a:bodyPr wrap="square" rtlCol="0">
+              <a:spAutoFit/>
+            </a:bodyPr>
+            <a:lstStyle/>
+            <a:p>
+              <a:pPr algn="ctr"/>
+              <a:r>
+                <a:rPr lang="en-US" b="1" dirty="0">
+                  <a:solidFill>
+                    <a:schemeClr val="bg1"/>
+                  </a:solidFill>
+                  <a:latin typeface="Courier New" panose="02070309020205020404" pitchFamily="49" charset="0"/>
+                  <a:cs typeface="Courier New" panose="02070309020205020404" pitchFamily="49" charset="0"/>
+                </a:rPr>
+                <a:t>One Day – One Adult</a:t>
+              </a:r>
+            </a:p>
+            <a:p>
+              <a:pPr algn="ctr"/>
+              <a:r>
+                <a:rPr lang="en-US" b="1" dirty="0">
+                  <a:solidFill>
+                    <a:schemeClr val="bg1"/>
+                  </a:solidFill>
+                  <a:latin typeface="Courier New" panose="02070309020205020404" pitchFamily="49" charset="0"/>
+                  <a:cs typeface="Courier New" panose="02070309020205020404" pitchFamily="49" charset="0"/>
+                </a:rPr>
+                <a:t>Admission</a:t>
+              </a:r>
+            </a:p>
+            <a:p>
+              <a:pPr algn="ctr"/>
+              <a:r>
+                <a:rPr lang="en-US" sz="4000" b="1" dirty="0">
+                  <a:solidFill>
+                    <a:schemeClr val="bg1"/>
+                  </a:solidFill>
+                  <a:latin typeface="Courier New" panose="02070309020205020404" pitchFamily="49" charset="0"/>
+                  <a:cs typeface="Courier New" panose="02070309020205020404" pitchFamily="49" charset="0"/>
+                </a:rPr>
+                <a:t>$103.73</a:t>
+              </a:r>
+            </a:p>
+          </p:txBody>
+        </p:sp>
+      </p:grpSp>
+    </p:spTree>
+    <p:extLst>
+      <p:ext uri="{BB962C8B-B14F-4D97-AF65-F5344CB8AC3E}">
+        <p14:creationId xmlns:p14="http://schemas.microsoft.com/office/powerpoint/2010/main" val="1938374849"/>
+      </p:ext>
+    </p:extLst>
+  </p:cSld>
+  <p:clrMapOvr>
+    <a:masterClrMapping/>
+  </p:clrMapOvr>
+  <p:timing>
+    <p:tnLst>
+      <p:par>
+        <p:cTn id="1" dur="indefinite" restart="never" nodeType="tmRoot">
+          <p:childTnLst>
+            <p:seq concurrent="1" nextAc="seek">
+              <p:cTn id="2" dur="indefinite" nodeType="mainSeq">
+                <p:childTnLst>
+                  <p:par>
+                    <p:cTn id="3" fill="hold">
+                      <p:stCondLst>
+                        <p:cond delay="indefinite"/>
+                      </p:stCondLst>
+                      <p:childTnLst>
+                        <p:par>
+                          <p:cTn id="4" fill="hold">
+                            <p:stCondLst>
+                              <p:cond delay="0"/>
+                            </p:stCondLst>
+                            <p:childTnLst>
+                              <p:par>
+                                <p:cTn id="5" presetID="10" presetClass="entr" presetSubtype="0" fill="hold" nodeType="clickEffect">
+                                  <p:stCondLst>
+                                    <p:cond delay="0"/>
+                                  </p:stCondLst>
+                                  <p:childTnLst>
+                                    <p:set>
+                                      <p:cBhvr>
+                                        <p:cTn id="6" dur="1" fill="hold">
+                                          <p:stCondLst>
+                                            <p:cond delay="0"/>
+                                          </p:stCondLst>
+                                        </p:cTn>
+                                        <p:tgtEl>
+                                          <p:spTgt spid="2">
+                                            <p:txEl>
+                                              <p:pRg st="2" end="2"/>
+                                            </p:txEl>
+                                          </p:spTgt>
+                                        </p:tgtEl>
+                                        <p:attrNameLst>
+                                          <p:attrName>style.visibility</p:attrName>
+                                        </p:attrNameLst>
+                                      </p:cBhvr>
+                                      <p:to>
+                                        <p:strVal val="visible"/>
+                                      </p:to>
+                                    </p:set>
+                                    <p:animEffect transition="in" filter="fade">
+                                      <p:cBhvr>
+                                        <p:cTn id="7" dur="500"/>
+                                        <p:tgtEl>
+                                          <p:spTgt spid="2">
+                                            <p:txEl>
+                                              <p:pRg st="2" end="2"/>
+                                            </p:txEl>
+                                          </p:spTgt>
+                                        </p:tgtEl>
+                                      </p:cBhvr>
+                                    </p:animEffect>
+                                  </p:childTnLst>
+                                </p:cTn>
+                              </p:par>
+                            </p:childTnLst>
+                          </p:cTn>
+                        </p:par>
+                      </p:childTnLst>
+                    </p:cTn>
+                  </p:par>
+                  <p:par>
+                    <p:cTn id="8" fill="hold">
+                      <p:stCondLst>
+                        <p:cond delay="indefinite"/>
+                      </p:stCondLst>
+                      <p:childTnLst>
+                        <p:par>
+                          <p:cTn id="9" fill="hold">
+                            <p:stCondLst>
+                              <p:cond delay="0"/>
+                            </p:stCondLst>
+                            <p:childTnLst>
+                              <p:par>
+                                <p:cTn id="10" presetID="10" presetClass="entr" presetSubtype="0" fill="hold" nodeType="clickEffect">
+                                  <p:stCondLst>
+                                    <p:cond delay="0"/>
+                                  </p:stCondLst>
+                                  <p:childTnLst>
+                                    <p:set>
+                                      <p:cBhvr>
+                                        <p:cTn id="11" dur="1" fill="hold">
+                                          <p:stCondLst>
+                                            <p:cond delay="0"/>
+                                          </p:stCondLst>
+                                        </p:cTn>
+                                        <p:tgtEl>
+                                          <p:spTgt spid="2">
+                                            <p:txEl>
+                                              <p:pRg st="3" end="3"/>
+                                            </p:txEl>
+                                          </p:spTgt>
+                                        </p:tgtEl>
+                                        <p:attrNameLst>
+                                          <p:attrName>style.visibility</p:attrName>
+                                        </p:attrNameLst>
+                                      </p:cBhvr>
+                                      <p:to>
+                                        <p:strVal val="visible"/>
+                                      </p:to>
+                                    </p:set>
+                                    <p:animEffect transition="in" filter="fade">
+                                      <p:cBhvr>
+                                        <p:cTn id="12" dur="500"/>
+                                        <p:tgtEl>
+                                          <p:spTgt spid="2">
+                                            <p:txEl>
+                                              <p:pRg st="3" end="3"/>
+                                            </p:txEl>
+                                          </p:spTgt>
+                                        </p:tgtEl>
+                                      </p:cBhvr>
+                                    </p:animEffect>
+                                  </p:childTnLst>
+                                </p:cTn>
+                              </p:par>
+                            </p:childTnLst>
+                          </p:cTn>
+                        </p:par>
+                      </p:childTnLst>
+                    </p:cTn>
+                  </p:par>
+                  <p:par>
+                    <p:cTn id="13" fill="hold">
+                      <p:stCondLst>
+                        <p:cond delay="indefinite"/>
+                      </p:stCondLst>
+                      <p:childTnLst>
+                        <p:par>
+                          <p:cTn id="14" fill="hold">
+                            <p:stCondLst>
+                              <p:cond delay="0"/>
+                            </p:stCondLst>
+                            <p:childTnLst>
+                              <p:par>
+                                <p:cTn id="15" presetID="10" presetClass="entr" presetSubtype="0" fill="hold" nodeType="clickEffect">
+                                  <p:stCondLst>
+                                    <p:cond delay="0"/>
+                                  </p:stCondLst>
+                                  <p:childTnLst>
+                                    <p:set>
+                                      <p:cBhvr>
+                                        <p:cTn id="16" dur="1" fill="hold">
+                                          <p:stCondLst>
+                                            <p:cond delay="0"/>
+                                          </p:stCondLst>
+                                        </p:cTn>
+                                        <p:tgtEl>
+                                          <p:spTgt spid="2">
+                                            <p:txEl>
+                                              <p:pRg st="4" end="4"/>
+                                            </p:txEl>
+                                          </p:spTgt>
+                                        </p:tgtEl>
+                                        <p:attrNameLst>
+                                          <p:attrName>style.visibility</p:attrName>
+                                        </p:attrNameLst>
+                                      </p:cBhvr>
+                                      <p:to>
+                                        <p:strVal val="visible"/>
+                                      </p:to>
+                                    </p:set>
+                                    <p:animEffect transition="in" filter="fade">
+                                      <p:cBhvr>
+                                        <p:cTn id="17" dur="500"/>
+                                        <p:tgtEl>
+                                          <p:spTgt spid="2">
+                                            <p:txEl>
+                                              <p:pRg st="4" end="4"/>
+                                            </p:txEl>
+                                          </p:spTgt>
+                                        </p:tgtEl>
+                                      </p:cBhvr>
+                                    </p:animEffect>
+                                  </p:childTnLst>
+                                </p:cTn>
+                              </p:par>
+                            </p:childTnLst>
+                          </p:cTn>
+                        </p:par>
+                      </p:childTnLst>
+                    </p:cTn>
+                  </p:par>
+                  <p:par>
+                    <p:cTn id="18" fill="hold">
+                      <p:stCondLst>
+                        <p:cond delay="indefinite"/>
+                      </p:stCondLst>
+                      <p:childTnLst>
+                        <p:par>
+                          <p:cTn id="19" fill="hold">
+                            <p:stCondLst>
+                              <p:cond delay="0"/>
+                            </p:stCondLst>
+                            <p:childTnLst>
+                              <p:par>
+                                <p:cTn id="20" presetID="10" presetClass="entr" presetSubtype="0" fill="hold" nodeType="clickEffect">
+                                  <p:stCondLst>
+                                    <p:cond delay="0"/>
+                                  </p:stCondLst>
+                                  <p:childTnLst>
+                                    <p:set>
+                                      <p:cBhvr>
+                                        <p:cTn id="21" dur="1" fill="hold">
+                                          <p:stCondLst>
+                                            <p:cond delay="0"/>
+                                          </p:stCondLst>
+                                        </p:cTn>
+                                        <p:tgtEl>
+                                          <p:spTgt spid="9"/>
+                                        </p:tgtEl>
+                                        <p:attrNameLst>
+                                          <p:attrName>style.visibility</p:attrName>
+                                        </p:attrNameLst>
+                                      </p:cBhvr>
+                                      <p:to>
+                                        <p:strVal val="visible"/>
+                                      </p:to>
+                                    </p:set>
+                                    <p:animEffect transition="in" filter="fade">
+                                      <p:cBhvr>
+                                        <p:cTn id="22" dur="500"/>
+                                        <p:tgtEl>
+                                          <p:spTgt spid="9"/>
+                                        </p:tgtEl>
+                                      </p:cBhvr>
+                                    </p:animEffect>
+                                  </p:childTnLst>
+                                </p:cTn>
+                              </p:par>
+                            </p:childTnLst>
+                          </p:cTn>
+                        </p:par>
+                      </p:childTnLst>
+                    </p:cTn>
+                  </p:par>
+                </p:childTnLst>
+              </p:cTn>
+              <p:prevCondLst>
+                <p:cond evt="onPrev" delay="0">
+                  <p:tgtEl>
+                    <p:sldTgt/>
+                  </p:tgtEl>
+                </p:cond>
+              </p:prevCondLst>
+              <p:nextCondLst>
+                <p:cond evt="onNext" delay="0">
+                  <p:tgtEl>
+                    <p:sldTgt/>
+                  </p:tgtEl>
+                </p:cond>
+              </p:nextCondLst>
+            </p:seq>
+          </p:childTnLst>
+        </p:cTn>
+      </p:par>
+    </p:tnLst>
+  </p:timing>
+</p:sld>
+</file>
+
+<file path=ppt/slides/slide5.xml><?xml version="1.0" encoding="utf-8"?>
+<p:sld xmlns:a="http://schemas.openxmlformats.org/drawingml/2006/main" xmlns:r="http://schemas.openxmlformats.org/officeDocument/2006/relationships" xmlns:p="http://schemas.openxmlformats.org/presentationml/2006/main">
+  <p:cSld>
+    <p:spTree>
+      <p:nvGrpSpPr>
+        <p:cNvPr id="1" name=""/>
+        <p:cNvGrpSpPr/>
+        <p:nvPr/>
+      </p:nvGrpSpPr>
+      <p:grpSpPr>
+        <a:xfrm>
+          <a:off x="0" y="0"/>
+          <a:ext cx="0" cy="0"/>
+          <a:chOff x="0" y="0"/>
+          <a:chExt cx="0" cy="0"/>
+        </a:xfrm>
+      </p:grpSpPr>
+      <p:sp>
+        <p:nvSpPr>
+          <p:cNvPr id="2" name="TextBox 1">
+            <a:extLst>
+              <a:ext uri="{FF2B5EF4-FFF2-40B4-BE49-F238E27FC236}">
+                <a16:creationId xmlns:a16="http://schemas.microsoft.com/office/drawing/2014/main" id="{D7CBFB92-62FD-C46A-B631-6E51CF9A39A2}"/>
+              </a:ext>
+            </a:extLst>
+          </p:cNvPr>
+          <p:cNvSpPr txBox="1"/>
+          <p:nvPr/>
+        </p:nvSpPr>
+        <p:spPr>
+          <a:xfrm>
+            <a:off x="0" y="0"/>
+            <a:ext cx="12192000" cy="1015663"/>
+          </a:xfrm>
+          <a:prstGeom prst="rect">
+            <a:avLst/>
+          </a:prstGeom>
+          <a:noFill/>
+        </p:spPr>
+        <p:txBody>
+          <a:bodyPr wrap="square" rtlCol="0">
+            <a:spAutoFit/>
+          </a:bodyPr>
+          <a:lstStyle/>
+          <a:p>
+            <a:r>
+              <a:rPr lang="en-US" sz="2400" dirty="0">
+                <a:solidFill>
+                  <a:schemeClr val="accent1">
+                    <a:lumMod val="75000"/>
+                  </a:schemeClr>
+                </a:solidFill>
+                <a:latin typeface="Baskerville Old Face" panose="02020602080505020303" pitchFamily="18" charset="0"/>
+                <a:cs typeface="Biome" panose="020B0502040204020203" pitchFamily="34" charset="0"/>
+              </a:rPr>
+              <a:t>Modeling Results and Analysis</a:t>
+            </a:r>
+          </a:p>
+          <a:p>
+            <a:pPr algn="ctr"/>
+            <a:r>
+              <a:rPr lang="en-US" sz="3600" u="sng" dirty="0">
+                <a:solidFill>
+                  <a:schemeClr val="accent1">
+                    <a:lumMod val="40000"/>
+                    <a:lumOff val="60000"/>
+                  </a:schemeClr>
+                </a:solidFill>
+                <a:latin typeface="Baskerville Old Face" panose="02020602080505020303" pitchFamily="18" charset="0"/>
+                <a:cs typeface="Biome" panose="020B0502040204020203" pitchFamily="34" charset="0"/>
+              </a:rPr>
+              <a:t>Exploratory Data Analysis:</a:t>
+            </a:r>
+          </a:p>
+        </p:txBody>
+      </p:sp>
+      <p:pic>
+        <p:nvPicPr>
+          <p:cNvPr id="3" name="Picture 2" descr="Mountains Snow White - Free image on Pixabay">
+            <a:extLst>
+              <a:ext uri="{FF2B5EF4-FFF2-40B4-BE49-F238E27FC236}">
+                <a16:creationId xmlns:a16="http://schemas.microsoft.com/office/drawing/2014/main" id="{56044481-F62F-EC90-E56D-949B9880687F}"/>
+              </a:ext>
+            </a:extLst>
+          </p:cNvPr>
+          <p:cNvPicPr>
+            <a:picLocks noChangeAspect="1" noChangeArrowheads="1"/>
+          </p:cNvPicPr>
+          <p:nvPr/>
+        </p:nvPicPr>
+        <p:blipFill rotWithShape="1">
+          <a:blip>
+            <a:extLst>
+              <a:ext uri="{28A0092B-C50C-407E-A947-70E740481C1C}">
+                <a14:useLocalDpi xmlns:a14="http://schemas.microsoft.com/office/drawing/2010/main" val="0"/>
+              </a:ext>
+            </a:extLst>
+          </a:blip>
+          <a:srcRect t="15318" b="39775"/>
+          <a:stretch/>
+        </p:blipFill>
+        <p:spPr bwMode="auto">
+          <a:xfrm>
+            <a:off x="0" y="3209662"/>
+            <a:ext cx="12192000" cy="3648338"/>
+          </a:xfrm>
+          <a:prstGeom prst="rect">
+            <a:avLst/>
+          </a:prstGeom>
+          <a:noFill/>
+          <a:extLst>
+            <a:ext uri="{909E8E84-426E-40DD-AFC4-6F175D3DCCD1}">
+              <a14:hiddenFill xmlns:a14="http://schemas.microsoft.com/office/drawing/2010/main">
+                <a:solidFill>
+                  <a:srgbClr val="FFFFFF"/>
+                </a:solidFill>
+              </a14:hiddenFill>
+            </a:ext>
+          </a:extLst>
+        </p:spPr>
+      </p:pic>
+    </p:spTree>
+    <p:extLst>
+      <p:ext uri="{BB962C8B-B14F-4D97-AF65-F5344CB8AC3E}">
+        <p14:creationId xmlns:p14="http://schemas.microsoft.com/office/powerpoint/2010/main" val="629273672"/>
       </p:ext>
     </p:extLst>
   </p:cSld>

</xml_diff>